<commit_message>
Edits to paper sources and presentation files
</commit_message>
<xml_diff>
--- a/sampexlib/Saved Plots/Research Paper Plots/Temporary Panel Creator.pptx
+++ b/sampexlib/Saved Plots/Research Paper Plots/Temporary Panel Creator.pptx
@@ -8,7 +8,8 @@
     <p:sldId id="256" r:id="rId2"/>
     <p:sldId id="257" r:id="rId3"/>
     <p:sldId id="258" r:id="rId4"/>
-    <p:sldId id="259" r:id="rId5"/>
+    <p:sldId id="260" r:id="rId5"/>
+    <p:sldId id="259" r:id="rId6"/>
   </p:sldIdLst>
   <p:sldSz cx="12192000" cy="6858000"/>
   <p:notesSz cx="6858000" cy="9144000"/>
@@ -107,6 +108,11 @@
       </a:defRPr>
     </a:lvl9pPr>
   </p:defaultTextStyle>
+  <p:extLst>
+    <p:ext uri="{EFAFB233-063F-42B5-8137-9DF3F51BA10A}">
+      <p15:sldGuideLst xmlns:p15="http://schemas.microsoft.com/office/powerpoint/2012/main"/>
+    </p:ext>
+  </p:extLst>
 </p:presentation>
 </file>
 
@@ -257,7 +263,7 @@
           <a:p>
             <a:fld id="{492BE7D4-8037-4E12-A2D9-2553F853E8F1}" type="datetimeFigureOut">
               <a:rPr lang="en-US" smtClean="0"/>
-              <a:t>2/1/2022</a:t>
+              <a:t>2/22/2022</a:t>
             </a:fld>
             <a:endParaRPr lang="en-US"/>
           </a:p>
@@ -455,7 +461,7 @@
           <a:p>
             <a:fld id="{492BE7D4-8037-4E12-A2D9-2553F853E8F1}" type="datetimeFigureOut">
               <a:rPr lang="en-US" smtClean="0"/>
-              <a:t>2/1/2022</a:t>
+              <a:t>2/22/2022</a:t>
             </a:fld>
             <a:endParaRPr lang="en-US"/>
           </a:p>
@@ -663,7 +669,7 @@
           <a:p>
             <a:fld id="{492BE7D4-8037-4E12-A2D9-2553F853E8F1}" type="datetimeFigureOut">
               <a:rPr lang="en-US" smtClean="0"/>
-              <a:t>2/1/2022</a:t>
+              <a:t>2/22/2022</a:t>
             </a:fld>
             <a:endParaRPr lang="en-US"/>
           </a:p>
@@ -861,7 +867,7 @@
           <a:p>
             <a:fld id="{492BE7D4-8037-4E12-A2D9-2553F853E8F1}" type="datetimeFigureOut">
               <a:rPr lang="en-US" smtClean="0"/>
-              <a:t>2/1/2022</a:t>
+              <a:t>2/22/2022</a:t>
             </a:fld>
             <a:endParaRPr lang="en-US"/>
           </a:p>
@@ -1136,7 +1142,7 @@
           <a:p>
             <a:fld id="{492BE7D4-8037-4E12-A2D9-2553F853E8F1}" type="datetimeFigureOut">
               <a:rPr lang="en-US" smtClean="0"/>
-              <a:t>2/1/2022</a:t>
+              <a:t>2/22/2022</a:t>
             </a:fld>
             <a:endParaRPr lang="en-US"/>
           </a:p>
@@ -1401,7 +1407,7 @@
           <a:p>
             <a:fld id="{492BE7D4-8037-4E12-A2D9-2553F853E8F1}" type="datetimeFigureOut">
               <a:rPr lang="en-US" smtClean="0"/>
-              <a:t>2/1/2022</a:t>
+              <a:t>2/22/2022</a:t>
             </a:fld>
             <a:endParaRPr lang="en-US"/>
           </a:p>
@@ -1813,7 +1819,7 @@
           <a:p>
             <a:fld id="{492BE7D4-8037-4E12-A2D9-2553F853E8F1}" type="datetimeFigureOut">
               <a:rPr lang="en-US" smtClean="0"/>
-              <a:t>2/1/2022</a:t>
+              <a:t>2/22/2022</a:t>
             </a:fld>
             <a:endParaRPr lang="en-US"/>
           </a:p>
@@ -1954,7 +1960,7 @@
           <a:p>
             <a:fld id="{492BE7D4-8037-4E12-A2D9-2553F853E8F1}" type="datetimeFigureOut">
               <a:rPr lang="en-US" smtClean="0"/>
-              <a:t>2/1/2022</a:t>
+              <a:t>2/22/2022</a:t>
             </a:fld>
             <a:endParaRPr lang="en-US"/>
           </a:p>
@@ -2067,7 +2073,7 @@
           <a:p>
             <a:fld id="{492BE7D4-8037-4E12-A2D9-2553F853E8F1}" type="datetimeFigureOut">
               <a:rPr lang="en-US" smtClean="0"/>
-              <a:t>2/1/2022</a:t>
+              <a:t>2/22/2022</a:t>
             </a:fld>
             <a:endParaRPr lang="en-US"/>
           </a:p>
@@ -2378,7 +2384,7 @@
           <a:p>
             <a:fld id="{492BE7D4-8037-4E12-A2D9-2553F853E8F1}" type="datetimeFigureOut">
               <a:rPr lang="en-US" smtClean="0"/>
-              <a:t>2/1/2022</a:t>
+              <a:t>2/22/2022</a:t>
             </a:fld>
             <a:endParaRPr lang="en-US"/>
           </a:p>
@@ -2666,7 +2672,7 @@
           <a:p>
             <a:fld id="{492BE7D4-8037-4E12-A2D9-2553F853E8F1}" type="datetimeFigureOut">
               <a:rPr lang="en-US" smtClean="0"/>
-              <a:t>2/1/2022</a:t>
+              <a:t>2/22/2022</a:t>
             </a:fld>
             <a:endParaRPr lang="en-US"/>
           </a:p>
@@ -2907,7 +2913,7 @@
           <a:p>
             <a:fld id="{492BE7D4-8037-4E12-A2D9-2553F853E8F1}" type="datetimeFigureOut">
               <a:rPr lang="en-US" smtClean="0"/>
-              <a:t>2/1/2022</a:t>
+              <a:t>2/22/2022</a:t>
             </a:fld>
             <a:endParaRPr lang="en-US"/>
           </a:p>
@@ -3731,6 +3737,106 @@
       </p:grpSpPr>
       <p:pic>
         <p:nvPicPr>
+          <p:cNvPr id="4" name="Picture 3" descr="Chart, box and whisker chart&#10;&#10;Description automatically generated">
+            <a:extLst>
+              <a:ext uri="{FF2B5EF4-FFF2-40B4-BE49-F238E27FC236}">
+                <a16:creationId xmlns:a16="http://schemas.microsoft.com/office/drawing/2014/main" id="{D4B4B304-3EA9-405E-95DF-0AB4F8883A71}"/>
+              </a:ext>
+            </a:extLst>
+          </p:cNvPr>
+          <p:cNvPicPr>
+            <a:picLocks noChangeAspect="1"/>
+          </p:cNvPicPr>
+          <p:nvPr/>
+        </p:nvPicPr>
+        <p:blipFill rotWithShape="1">
+          <a:blip r:embed="rId2">
+            <a:extLst>
+              <a:ext uri="{28A0092B-C50C-407E-A947-70E740481C1C}">
+                <a14:useLocalDpi xmlns:a14="http://schemas.microsoft.com/office/drawing/2010/main" val="0"/>
+              </a:ext>
+            </a:extLst>
+          </a:blip>
+          <a:srcRect b="5256"/>
+          <a:stretch/>
+        </p:blipFill>
+        <p:spPr>
+          <a:xfrm>
+            <a:off x="131221" y="1087644"/>
+            <a:ext cx="6069609" cy="4221473"/>
+          </a:xfrm>
+          <a:prstGeom prst="rect">
+            <a:avLst/>
+          </a:prstGeom>
+        </p:spPr>
+      </p:pic>
+      <p:pic>
+        <p:nvPicPr>
+          <p:cNvPr id="5" name="Picture 4" descr="Chart, box and whisker chart&#10;&#10;Description automatically generated">
+            <a:extLst>
+              <a:ext uri="{FF2B5EF4-FFF2-40B4-BE49-F238E27FC236}">
+                <a16:creationId xmlns:a16="http://schemas.microsoft.com/office/drawing/2014/main" id="{74E580C8-ADCE-438A-B0B4-016468F405DD}"/>
+              </a:ext>
+            </a:extLst>
+          </p:cNvPr>
+          <p:cNvPicPr>
+            <a:picLocks noChangeAspect="1"/>
+          </p:cNvPicPr>
+          <p:nvPr/>
+        </p:nvPicPr>
+        <p:blipFill rotWithShape="1">
+          <a:blip r:embed="rId3">
+            <a:extLst>
+              <a:ext uri="{28A0092B-C50C-407E-A947-70E740481C1C}">
+                <a14:useLocalDpi xmlns:a14="http://schemas.microsoft.com/office/drawing/2010/main" val="0"/>
+              </a:ext>
+            </a:extLst>
+          </a:blip>
+          <a:srcRect l="7747" b="5256"/>
+          <a:stretch/>
+        </p:blipFill>
+        <p:spPr>
+          <a:xfrm>
+            <a:off x="6200830" y="1087645"/>
+            <a:ext cx="5599395" cy="4221473"/>
+          </a:xfrm>
+          <a:prstGeom prst="rect">
+            <a:avLst/>
+          </a:prstGeom>
+        </p:spPr>
+      </p:pic>
+    </p:spTree>
+    <p:extLst>
+      <p:ext uri="{BB962C8B-B14F-4D97-AF65-F5344CB8AC3E}">
+        <p14:creationId xmlns:p14="http://schemas.microsoft.com/office/powerpoint/2010/main" val="4246931480"/>
+      </p:ext>
+    </p:extLst>
+  </p:cSld>
+  <p:clrMapOvr>
+    <a:masterClrMapping/>
+  </p:clrMapOvr>
+</p:sld>
+</file>
+
+<file path=ppt/slides/slide5.xml><?xml version="1.0" encoding="utf-8"?>
+<p:sld xmlns:a="http://schemas.openxmlformats.org/drawingml/2006/main" xmlns:r="http://schemas.openxmlformats.org/officeDocument/2006/relationships" xmlns:p="http://schemas.openxmlformats.org/presentationml/2006/main">
+  <p:cSld>
+    <p:spTree>
+      <p:nvGrpSpPr>
+        <p:cNvPr id="1" name=""/>
+        <p:cNvGrpSpPr/>
+        <p:nvPr/>
+      </p:nvGrpSpPr>
+      <p:grpSpPr>
+        <a:xfrm>
+          <a:off x="0" y="0"/>
+          <a:ext cx="0" cy="0"/>
+          <a:chOff x="0" y="0"/>
+          <a:chExt cx="0" cy="0"/>
+        </a:xfrm>
+      </p:grpSpPr>
+      <p:pic>
+        <p:nvPicPr>
           <p:cNvPr id="5" name="Picture 4" descr="Graphical user interface, chart, line chart&#10;&#10;Description automatically generated">
             <a:extLst>
               <a:ext uri="{FF2B5EF4-FFF2-40B4-BE49-F238E27FC236}">

</xml_diff>

<commit_message>
Changes to SAMPEX code and saved plots
</commit_message>
<xml_diff>
--- a/sampexlib/Saved Plots/Research Paper Plots/Temporary Panel Creator.pptx
+++ b/sampexlib/Saved Plots/Research Paper Plots/Temporary Panel Creator.pptx
@@ -263,7 +263,7 @@
           <a:p>
             <a:fld id="{492BE7D4-8037-4E12-A2D9-2553F853E8F1}" type="datetimeFigureOut">
               <a:rPr lang="en-US" smtClean="0"/>
-              <a:t>2/22/2022</a:t>
+              <a:t>3/15/2022</a:t>
             </a:fld>
             <a:endParaRPr lang="en-US"/>
           </a:p>
@@ -461,7 +461,7 @@
           <a:p>
             <a:fld id="{492BE7D4-8037-4E12-A2D9-2553F853E8F1}" type="datetimeFigureOut">
               <a:rPr lang="en-US" smtClean="0"/>
-              <a:t>2/22/2022</a:t>
+              <a:t>3/15/2022</a:t>
             </a:fld>
             <a:endParaRPr lang="en-US"/>
           </a:p>
@@ -669,7 +669,7 @@
           <a:p>
             <a:fld id="{492BE7D4-8037-4E12-A2D9-2553F853E8F1}" type="datetimeFigureOut">
               <a:rPr lang="en-US" smtClean="0"/>
-              <a:t>2/22/2022</a:t>
+              <a:t>3/15/2022</a:t>
             </a:fld>
             <a:endParaRPr lang="en-US"/>
           </a:p>
@@ -867,7 +867,7 @@
           <a:p>
             <a:fld id="{492BE7D4-8037-4E12-A2D9-2553F853E8F1}" type="datetimeFigureOut">
               <a:rPr lang="en-US" smtClean="0"/>
-              <a:t>2/22/2022</a:t>
+              <a:t>3/15/2022</a:t>
             </a:fld>
             <a:endParaRPr lang="en-US"/>
           </a:p>
@@ -1142,7 +1142,7 @@
           <a:p>
             <a:fld id="{492BE7D4-8037-4E12-A2D9-2553F853E8F1}" type="datetimeFigureOut">
               <a:rPr lang="en-US" smtClean="0"/>
-              <a:t>2/22/2022</a:t>
+              <a:t>3/15/2022</a:t>
             </a:fld>
             <a:endParaRPr lang="en-US"/>
           </a:p>
@@ -1407,7 +1407,7 @@
           <a:p>
             <a:fld id="{492BE7D4-8037-4E12-A2D9-2553F853E8F1}" type="datetimeFigureOut">
               <a:rPr lang="en-US" smtClean="0"/>
-              <a:t>2/22/2022</a:t>
+              <a:t>3/15/2022</a:t>
             </a:fld>
             <a:endParaRPr lang="en-US"/>
           </a:p>
@@ -1819,7 +1819,7 @@
           <a:p>
             <a:fld id="{492BE7D4-8037-4E12-A2D9-2553F853E8F1}" type="datetimeFigureOut">
               <a:rPr lang="en-US" smtClean="0"/>
-              <a:t>2/22/2022</a:t>
+              <a:t>3/15/2022</a:t>
             </a:fld>
             <a:endParaRPr lang="en-US"/>
           </a:p>
@@ -1960,7 +1960,7 @@
           <a:p>
             <a:fld id="{492BE7D4-8037-4E12-A2D9-2553F853E8F1}" type="datetimeFigureOut">
               <a:rPr lang="en-US" smtClean="0"/>
-              <a:t>2/22/2022</a:t>
+              <a:t>3/15/2022</a:t>
             </a:fld>
             <a:endParaRPr lang="en-US"/>
           </a:p>
@@ -2073,7 +2073,7 @@
           <a:p>
             <a:fld id="{492BE7D4-8037-4E12-A2D9-2553F853E8F1}" type="datetimeFigureOut">
               <a:rPr lang="en-US" smtClean="0"/>
-              <a:t>2/22/2022</a:t>
+              <a:t>3/15/2022</a:t>
             </a:fld>
             <a:endParaRPr lang="en-US"/>
           </a:p>
@@ -2384,7 +2384,7 @@
           <a:p>
             <a:fld id="{492BE7D4-8037-4E12-A2D9-2553F853E8F1}" type="datetimeFigureOut">
               <a:rPr lang="en-US" smtClean="0"/>
-              <a:t>2/22/2022</a:t>
+              <a:t>3/15/2022</a:t>
             </a:fld>
             <a:endParaRPr lang="en-US"/>
           </a:p>
@@ -2672,7 +2672,7 @@
           <a:p>
             <a:fld id="{492BE7D4-8037-4E12-A2D9-2553F853E8F1}" type="datetimeFigureOut">
               <a:rPr lang="en-US" smtClean="0"/>
-              <a:t>2/22/2022</a:t>
+              <a:t>3/15/2022</a:t>
             </a:fld>
             <a:endParaRPr lang="en-US"/>
           </a:p>
@@ -2913,7 +2913,7 @@
           <a:p>
             <a:fld id="{492BE7D4-8037-4E12-A2D9-2553F853E8F1}" type="datetimeFigureOut">
               <a:rPr lang="en-US" smtClean="0"/>
-              <a:t>2/22/2022</a:t>
+              <a:t>3/15/2022</a:t>
             </a:fld>
             <a:endParaRPr lang="en-US"/>
           </a:p>
@@ -3332,10 +3332,10 @@
       </p:grpSpPr>
       <p:pic>
         <p:nvPicPr>
-          <p:cNvPr id="5" name="Picture 4" descr="Chart, histogram&#10;&#10;Description automatically generated">
-            <a:extLst>
-              <a:ext uri="{FF2B5EF4-FFF2-40B4-BE49-F238E27FC236}">
-                <a16:creationId xmlns:a16="http://schemas.microsoft.com/office/drawing/2014/main" id="{B7EC848A-2634-4816-8451-14B87E7AC2C0}"/>
+          <p:cNvPr id="3" name="Picture 2" descr="Chart, line chart&#10;&#10;Description automatically generated">
+            <a:extLst>
+              <a:ext uri="{FF2B5EF4-FFF2-40B4-BE49-F238E27FC236}">
+                <a16:creationId xmlns:a16="http://schemas.microsoft.com/office/drawing/2014/main" id="{9A2440D0-A3DB-42FA-BF1F-D34BD9CB0077}"/>
               </a:ext>
             </a:extLst>
           </p:cNvPr>
@@ -3344,7 +3344,7 @@
           </p:cNvPicPr>
           <p:nvPr/>
         </p:nvPicPr>
-        <p:blipFill rotWithShape="1">
+        <p:blipFill>
           <a:blip r:embed="rId2">
             <a:extLst>
               <a:ext uri="{28A0092B-C50C-407E-A947-70E740481C1C}">
@@ -3352,13 +3352,14 @@
               </a:ext>
             </a:extLst>
           </a:blip>
-          <a:srcRect t="-1138" b="1"/>
-          <a:stretch/>
+          <a:stretch>
+            <a:fillRect/>
+          </a:stretch>
         </p:blipFill>
         <p:spPr>
           <a:xfrm>
-            <a:off x="1987420" y="3125755"/>
-            <a:ext cx="7368784" cy="3457118"/>
+            <a:off x="1950097" y="70684"/>
+            <a:ext cx="8142159" cy="3283669"/>
           </a:xfrm>
           <a:prstGeom prst="rect">
             <a:avLst/>
@@ -3367,10 +3368,10 @@
       </p:pic>
       <p:pic>
         <p:nvPicPr>
-          <p:cNvPr id="7" name="Picture 6" descr="Chart, line chart, histogram&#10;&#10;Description automatically generated">
-            <a:extLst>
-              <a:ext uri="{FF2B5EF4-FFF2-40B4-BE49-F238E27FC236}">
-                <a16:creationId xmlns:a16="http://schemas.microsoft.com/office/drawing/2014/main" id="{35412728-3AB6-42F2-8615-4ADEA217041E}"/>
+          <p:cNvPr id="13" name="Picture 12" descr="Chart, histogram&#10;&#10;Description automatically generated">
+            <a:extLst>
+              <a:ext uri="{FF2B5EF4-FFF2-40B4-BE49-F238E27FC236}">
+                <a16:creationId xmlns:a16="http://schemas.microsoft.com/office/drawing/2014/main" id="{DC86CE6E-5325-407A-BF53-7463A32CA12A}"/>
               </a:ext>
             </a:extLst>
           </p:cNvPr>
@@ -3379,7 +3380,7 @@
           </p:cNvPicPr>
           <p:nvPr/>
         </p:nvPicPr>
-        <p:blipFill rotWithShape="1">
+        <p:blipFill>
           <a:blip r:embed="rId3">
             <a:extLst>
               <a:ext uri="{28A0092B-C50C-407E-A947-70E740481C1C}">
@@ -3387,13 +3388,14 @@
               </a:ext>
             </a:extLst>
           </a:blip>
-          <a:srcRect b="11824"/>
-          <a:stretch/>
+          <a:stretch>
+            <a:fillRect/>
+          </a:stretch>
         </p:blipFill>
         <p:spPr>
           <a:xfrm>
-            <a:off x="1987420" y="354564"/>
-            <a:ext cx="7368784" cy="2864498"/>
+            <a:off x="1988287" y="3204361"/>
+            <a:ext cx="8103969" cy="3582955"/>
           </a:xfrm>
           <a:prstGeom prst="rect">
             <a:avLst/>
@@ -3602,10 +3604,10 @@
       </p:grpSpPr>
       <p:pic>
         <p:nvPicPr>
-          <p:cNvPr id="5" name="Picture 4" descr="Chart, box and whisker chart&#10;&#10;Description automatically generated">
-            <a:extLst>
-              <a:ext uri="{FF2B5EF4-FFF2-40B4-BE49-F238E27FC236}">
-                <a16:creationId xmlns:a16="http://schemas.microsoft.com/office/drawing/2014/main" id="{B2928A8D-78D8-49B1-9AE8-6CBF517A8008}"/>
+          <p:cNvPr id="12" name="Picture 11" descr="Chart, box and whisker chart&#10;&#10;Description automatically generated">
+            <a:extLst>
+              <a:ext uri="{FF2B5EF4-FFF2-40B4-BE49-F238E27FC236}">
+                <a16:creationId xmlns:a16="http://schemas.microsoft.com/office/drawing/2014/main" id="{5208F915-A20E-463A-AC14-455A52C40CD8}"/>
               </a:ext>
             </a:extLst>
           </p:cNvPr>
@@ -3614,7 +3616,7 @@
           </p:cNvPicPr>
           <p:nvPr/>
         </p:nvPicPr>
-        <p:blipFill rotWithShape="1">
+        <p:blipFill>
           <a:blip r:embed="rId2">
             <a:extLst>
               <a:ext uri="{28A0092B-C50C-407E-A947-70E740481C1C}">
@@ -3622,13 +3624,14 @@
               </a:ext>
             </a:extLst>
           </a:blip>
-          <a:srcRect b="5256"/>
-          <a:stretch/>
+          <a:stretch>
+            <a:fillRect/>
+          </a:stretch>
         </p:blipFill>
         <p:spPr>
           <a:xfrm>
-            <a:off x="1198221" y="191907"/>
-            <a:ext cx="4654273" cy="3237093"/>
+            <a:off x="4169990" y="1883004"/>
+            <a:ext cx="3799911" cy="2907758"/>
           </a:xfrm>
           <a:prstGeom prst="rect">
             <a:avLst/>
@@ -3637,10 +3640,10 @@
       </p:pic>
       <p:pic>
         <p:nvPicPr>
-          <p:cNvPr id="7" name="Picture 6" descr="Chart, box and whisker chart&#10;&#10;Description automatically generated">
-            <a:extLst>
-              <a:ext uri="{FF2B5EF4-FFF2-40B4-BE49-F238E27FC236}">
-                <a16:creationId xmlns:a16="http://schemas.microsoft.com/office/drawing/2014/main" id="{97A72713-9EDD-41A1-B0C8-56DB5643BF89}"/>
+          <p:cNvPr id="14" name="Picture 13" descr="Chart, box and whisker chart&#10;&#10;Description automatically generated">
+            <a:extLst>
+              <a:ext uri="{FF2B5EF4-FFF2-40B4-BE49-F238E27FC236}">
+                <a16:creationId xmlns:a16="http://schemas.microsoft.com/office/drawing/2014/main" id="{766D276A-91F2-4A1D-A59F-C9BC7ED82A30}"/>
               </a:ext>
             </a:extLst>
           </p:cNvPr>
@@ -3649,7 +3652,7 @@
           </p:cNvPicPr>
           <p:nvPr/>
         </p:nvPicPr>
-        <p:blipFill rotWithShape="1">
+        <p:blipFill>
           <a:blip r:embed="rId3">
             <a:extLst>
               <a:ext uri="{28A0092B-C50C-407E-A947-70E740481C1C}">
@@ -3657,13 +3660,14 @@
               </a:ext>
             </a:extLst>
           </a:blip>
-          <a:srcRect l="7747" b="5256"/>
-          <a:stretch/>
+          <a:stretch>
+            <a:fillRect/>
+          </a:stretch>
         </p:blipFill>
         <p:spPr>
           <a:xfrm>
-            <a:off x="5852494" y="191906"/>
-            <a:ext cx="4293706" cy="3237093"/>
+            <a:off x="65988" y="1883004"/>
+            <a:ext cx="4169990" cy="2907758"/>
           </a:xfrm>
           <a:prstGeom prst="rect">
             <a:avLst/>
@@ -3672,10 +3676,10 @@
       </p:pic>
       <p:pic>
         <p:nvPicPr>
-          <p:cNvPr id="9" name="Picture 8" descr="Chart, box and whisker chart&#10;&#10;Description automatically generated">
-            <a:extLst>
-              <a:ext uri="{FF2B5EF4-FFF2-40B4-BE49-F238E27FC236}">
-                <a16:creationId xmlns:a16="http://schemas.microsoft.com/office/drawing/2014/main" id="{D6ED0077-0514-4D3E-9603-EA49A5EA2615}"/>
+          <p:cNvPr id="16" name="Picture 15" descr="Chart, box and whisker chart&#10;&#10;Description automatically generated">
+            <a:extLst>
+              <a:ext uri="{FF2B5EF4-FFF2-40B4-BE49-F238E27FC236}">
+                <a16:creationId xmlns:a16="http://schemas.microsoft.com/office/drawing/2014/main" id="{43B86CBD-2BD0-4002-817B-B13DB6606CE9}"/>
               </a:ext>
             </a:extLst>
           </p:cNvPr>
@@ -3684,7 +3688,7 @@
           </p:cNvPicPr>
           <p:nvPr/>
         </p:nvPicPr>
-        <p:blipFill rotWithShape="1">
+        <p:blipFill>
           <a:blip r:embed="rId4">
             <a:extLst>
               <a:ext uri="{28A0092B-C50C-407E-A947-70E740481C1C}">
@@ -3692,13 +3696,14 @@
               </a:ext>
             </a:extLst>
           </a:blip>
-          <a:srcRect b="5256"/>
-          <a:stretch/>
+          <a:stretch>
+            <a:fillRect/>
+          </a:stretch>
         </p:blipFill>
         <p:spPr>
           <a:xfrm>
-            <a:off x="3284334" y="3428999"/>
-            <a:ext cx="4715013" cy="3237092"/>
+            <a:off x="7883824" y="1883004"/>
+            <a:ext cx="4117121" cy="2907758"/>
           </a:xfrm>
           <a:prstGeom prst="rect">
             <a:avLst/>
@@ -3837,10 +3842,10 @@
       </p:grpSpPr>
       <p:pic>
         <p:nvPicPr>
-          <p:cNvPr id="5" name="Picture 4" descr="Graphical user interface, chart, line chart&#10;&#10;Description automatically generated">
-            <a:extLst>
-              <a:ext uri="{FF2B5EF4-FFF2-40B4-BE49-F238E27FC236}">
-                <a16:creationId xmlns:a16="http://schemas.microsoft.com/office/drawing/2014/main" id="{A8D0492D-11CA-4AFA-AD93-E092D14C0712}"/>
+          <p:cNvPr id="10" name="Picture 9" descr="Graphical user interface, chart, line chart&#10;&#10;Description automatically generated">
+            <a:extLst>
+              <a:ext uri="{FF2B5EF4-FFF2-40B4-BE49-F238E27FC236}">
+                <a16:creationId xmlns:a16="http://schemas.microsoft.com/office/drawing/2014/main" id="{A618FE88-F220-4400-85CC-FEEADE30EDB6}"/>
               </a:ext>
             </a:extLst>
           </p:cNvPr>
@@ -3849,7 +3854,7 @@
           </p:cNvPicPr>
           <p:nvPr/>
         </p:nvPicPr>
-        <p:blipFill rotWithShape="1">
+        <p:blipFill>
           <a:blip r:embed="rId2">
             <a:extLst>
               <a:ext uri="{28A0092B-C50C-407E-A947-70E740481C1C}">
@@ -3857,13 +3862,14 @@
               </a:ext>
             </a:extLst>
           </a:blip>
-          <a:srcRect l="5726" r="8438"/>
-          <a:stretch/>
+          <a:stretch>
+            <a:fillRect/>
+          </a:stretch>
         </p:blipFill>
         <p:spPr>
           <a:xfrm>
-            <a:off x="0" y="876693"/>
-            <a:ext cx="4124703" cy="2402633"/>
+            <a:off x="7744486" y="184471"/>
+            <a:ext cx="3995902" cy="2092941"/>
           </a:xfrm>
           <a:prstGeom prst="rect">
             <a:avLst/>
@@ -3872,10 +3878,10 @@
       </p:pic>
       <p:pic>
         <p:nvPicPr>
-          <p:cNvPr id="7" name="Picture 6" descr="Chart, line chart&#10;&#10;Description automatically generated">
-            <a:extLst>
-              <a:ext uri="{FF2B5EF4-FFF2-40B4-BE49-F238E27FC236}">
-                <a16:creationId xmlns:a16="http://schemas.microsoft.com/office/drawing/2014/main" id="{6351E167-B979-4418-8AE1-4AD47C46D5B1}"/>
+          <p:cNvPr id="23" name="Picture 22" descr="Graphical user interface, chart, scatter chart&#10;&#10;Description automatically generated">
+            <a:extLst>
+              <a:ext uri="{FF2B5EF4-FFF2-40B4-BE49-F238E27FC236}">
+                <a16:creationId xmlns:a16="http://schemas.microsoft.com/office/drawing/2014/main" id="{103253BD-DC6F-499E-B022-B780AB752896}"/>
               </a:ext>
             </a:extLst>
           </p:cNvPr>
@@ -3884,7 +3890,7 @@
           </p:cNvPicPr>
           <p:nvPr/>
         </p:nvPicPr>
-        <p:blipFill rotWithShape="1">
+        <p:blipFill>
           <a:blip r:embed="rId3">
             <a:extLst>
               <a:ext uri="{28A0092B-C50C-407E-A947-70E740481C1C}">
@@ -3892,13 +3898,14 @@
               </a:ext>
             </a:extLst>
           </a:blip>
-          <a:srcRect l="5605" r="8438"/>
-          <a:stretch/>
+          <a:stretch>
+            <a:fillRect/>
+          </a:stretch>
         </p:blipFill>
         <p:spPr>
           <a:xfrm>
-            <a:off x="4071306" y="911899"/>
-            <a:ext cx="4130487" cy="2402633"/>
+            <a:off x="7744486" y="2277412"/>
+            <a:ext cx="3995904" cy="2092942"/>
           </a:xfrm>
           <a:prstGeom prst="rect">
             <a:avLst/>
@@ -3907,10 +3914,10 @@
       </p:pic>
       <p:pic>
         <p:nvPicPr>
-          <p:cNvPr id="9" name="Picture 8" descr="Chart, line chart&#10;&#10;Description automatically generated">
-            <a:extLst>
-              <a:ext uri="{FF2B5EF4-FFF2-40B4-BE49-F238E27FC236}">
-                <a16:creationId xmlns:a16="http://schemas.microsoft.com/office/drawing/2014/main" id="{43A49B92-F9FC-4D70-B779-358451E4E56B}"/>
+          <p:cNvPr id="17" name="Picture 16" descr="Chart, scatter chart&#10;&#10;Description automatically generated">
+            <a:extLst>
+              <a:ext uri="{FF2B5EF4-FFF2-40B4-BE49-F238E27FC236}">
+                <a16:creationId xmlns:a16="http://schemas.microsoft.com/office/drawing/2014/main" id="{BDBE5AA4-528F-4995-B90C-368B1D6CBD4C}"/>
               </a:ext>
             </a:extLst>
           </p:cNvPr>
@@ -3919,7 +3926,7 @@
           </p:cNvPicPr>
           <p:nvPr/>
         </p:nvPicPr>
-        <p:blipFill rotWithShape="1">
+        <p:blipFill>
           <a:blip r:embed="rId4">
             <a:extLst>
               <a:ext uri="{28A0092B-C50C-407E-A947-70E740481C1C}">
@@ -3927,13 +3934,14 @@
               </a:ext>
             </a:extLst>
           </a:blip>
-          <a:srcRect l="5605" r="8438"/>
-          <a:stretch/>
+          <a:stretch>
+            <a:fillRect/>
+          </a:stretch>
         </p:blipFill>
         <p:spPr>
           <a:xfrm>
-            <a:off x="8121692" y="947105"/>
-            <a:ext cx="4130490" cy="2402633"/>
+            <a:off x="3929326" y="2266295"/>
+            <a:ext cx="3964240" cy="2092941"/>
           </a:xfrm>
           <a:prstGeom prst="rect">
             <a:avLst/>
@@ -3942,10 +3950,10 @@
       </p:pic>
       <p:pic>
         <p:nvPicPr>
-          <p:cNvPr id="11" name="Picture 10" descr="Chart&#10;&#10;Description automatically generated">
-            <a:extLst>
-              <a:ext uri="{FF2B5EF4-FFF2-40B4-BE49-F238E27FC236}">
-                <a16:creationId xmlns:a16="http://schemas.microsoft.com/office/drawing/2014/main" id="{76B61503-34EF-46C7-81C0-D3BBA6777813}"/>
+          <p:cNvPr id="21" name="Picture 20" descr="Chart, line chart&#10;&#10;Description automatically generated">
+            <a:extLst>
+              <a:ext uri="{FF2B5EF4-FFF2-40B4-BE49-F238E27FC236}">
+                <a16:creationId xmlns:a16="http://schemas.microsoft.com/office/drawing/2014/main" id="{3B381A2A-EB04-46B2-88FD-AD4C4E04F7CA}"/>
               </a:ext>
             </a:extLst>
           </p:cNvPr>
@@ -3954,7 +3962,7 @@
           </p:cNvPicPr>
           <p:nvPr/>
         </p:nvPicPr>
-        <p:blipFill rotWithShape="1">
+        <p:blipFill>
           <a:blip r:embed="rId5">
             <a:extLst>
               <a:ext uri="{28A0092B-C50C-407E-A947-70E740481C1C}">
@@ -3962,13 +3970,14 @@
               </a:ext>
             </a:extLst>
           </a:blip>
-          <a:srcRect l="5726" r="8438"/>
-          <a:stretch/>
+          <a:stretch>
+            <a:fillRect/>
+          </a:stretch>
         </p:blipFill>
         <p:spPr>
           <a:xfrm>
-            <a:off x="0" y="3037269"/>
-            <a:ext cx="4124703" cy="2402633"/>
+            <a:off x="3929328" y="184471"/>
+            <a:ext cx="3964238" cy="2092941"/>
           </a:xfrm>
           <a:prstGeom prst="rect">
             <a:avLst/>
@@ -3977,10 +3986,10 @@
       </p:pic>
       <p:pic>
         <p:nvPicPr>
-          <p:cNvPr id="13" name="Picture 12" descr="Chart, scatter chart&#10;&#10;Description automatically generated">
-            <a:extLst>
-              <a:ext uri="{FF2B5EF4-FFF2-40B4-BE49-F238E27FC236}">
-                <a16:creationId xmlns:a16="http://schemas.microsoft.com/office/drawing/2014/main" id="{DB4D411C-F496-467F-9789-F3DC88DB8C35}"/>
+          <p:cNvPr id="3" name="Picture 2" descr="Graphical user interface, chart&#10;&#10;Description automatically generated">
+            <a:extLst>
+              <a:ext uri="{FF2B5EF4-FFF2-40B4-BE49-F238E27FC236}">
+                <a16:creationId xmlns:a16="http://schemas.microsoft.com/office/drawing/2014/main" id="{6FF2AE16-1137-48A9-A520-89A02E084FDC}"/>
               </a:ext>
             </a:extLst>
           </p:cNvPr>
@@ -3989,7 +3998,7 @@
           </p:cNvPicPr>
           <p:nvPr/>
         </p:nvPicPr>
-        <p:blipFill rotWithShape="1">
+        <p:blipFill>
           <a:blip r:embed="rId6">
             <a:extLst>
               <a:ext uri="{28A0092B-C50C-407E-A947-70E740481C1C}">
@@ -3997,13 +4006,14 @@
               </a:ext>
             </a:extLst>
           </a:blip>
-          <a:srcRect l="5689" r="7076"/>
-          <a:stretch/>
+          <a:stretch>
+            <a:fillRect/>
+          </a:stretch>
         </p:blipFill>
         <p:spPr>
           <a:xfrm>
-            <a:off x="4071306" y="3072475"/>
-            <a:ext cx="4130489" cy="2367427"/>
+            <a:off x="82506" y="184471"/>
+            <a:ext cx="3995902" cy="2092941"/>
           </a:xfrm>
           <a:prstGeom prst="rect">
             <a:avLst/>
@@ -4012,10 +4022,10 @@
       </p:pic>
       <p:pic>
         <p:nvPicPr>
-          <p:cNvPr id="15" name="Picture 14" descr="Chart, scatter chart&#10;&#10;Description automatically generated">
-            <a:extLst>
-              <a:ext uri="{FF2B5EF4-FFF2-40B4-BE49-F238E27FC236}">
-                <a16:creationId xmlns:a16="http://schemas.microsoft.com/office/drawing/2014/main" id="{09608229-4D8D-45B0-84E4-55D9168F0F1B}"/>
+          <p:cNvPr id="14" name="Picture 13" descr="Graphical user interface, chart, histogram&#10;&#10;Description automatically generated">
+            <a:extLst>
+              <a:ext uri="{FF2B5EF4-FFF2-40B4-BE49-F238E27FC236}">
+                <a16:creationId xmlns:a16="http://schemas.microsoft.com/office/drawing/2014/main" id="{9EFA8EF3-4516-4F72-93AD-295E89741B08}"/>
               </a:ext>
             </a:extLst>
           </p:cNvPr>
@@ -4024,7 +4034,7 @@
           </p:cNvPicPr>
           <p:nvPr/>
         </p:nvPicPr>
-        <p:blipFill rotWithShape="1">
+        <p:blipFill>
           <a:blip r:embed="rId7">
             <a:extLst>
               <a:ext uri="{28A0092B-C50C-407E-A947-70E740481C1C}">
@@ -4032,13 +4042,14 @@
               </a:ext>
             </a:extLst>
           </a:blip>
-          <a:srcRect l="5689" r="7076"/>
-          <a:stretch/>
+          <a:stretch>
+            <a:fillRect/>
+          </a:stretch>
         </p:blipFill>
         <p:spPr>
           <a:xfrm>
-            <a:off x="8121695" y="3072475"/>
-            <a:ext cx="4130489" cy="2367428"/>
+            <a:off x="82505" y="2266294"/>
+            <a:ext cx="3995903" cy="2092941"/>
           </a:xfrm>
           <a:prstGeom prst="rect">
             <a:avLst/>

</xml_diff>

<commit_message>
Updates to all figure generation code
</commit_message>
<xml_diff>
--- a/sampexlib/Saved Plots/Research Paper Plots/Temporary Panel Creator.pptx
+++ b/sampexlib/Saved Plots/Research Paper Plots/Temporary Panel Creator.pptx
@@ -6,10 +6,8 @@
   </p:sldMasterIdLst>
   <p:sldIdLst>
     <p:sldId id="256" r:id="rId2"/>
-    <p:sldId id="257" r:id="rId3"/>
-    <p:sldId id="258" r:id="rId4"/>
-    <p:sldId id="260" r:id="rId5"/>
-    <p:sldId id="259" r:id="rId6"/>
+    <p:sldId id="258" r:id="rId3"/>
+    <p:sldId id="259" r:id="rId4"/>
   </p:sldIdLst>
   <p:sldSz cx="12192000" cy="6858000"/>
   <p:notesSz cx="6858000" cy="9144000"/>
@@ -263,7 +261,7 @@
           <a:p>
             <a:fld id="{492BE7D4-8037-4E12-A2D9-2553F853E8F1}" type="datetimeFigureOut">
               <a:rPr lang="en-US" smtClean="0"/>
-              <a:t>3/15/2022</a:t>
+              <a:t>3/21/2022</a:t>
             </a:fld>
             <a:endParaRPr lang="en-US"/>
           </a:p>
@@ -461,7 +459,7 @@
           <a:p>
             <a:fld id="{492BE7D4-8037-4E12-A2D9-2553F853E8F1}" type="datetimeFigureOut">
               <a:rPr lang="en-US" smtClean="0"/>
-              <a:t>3/15/2022</a:t>
+              <a:t>3/21/2022</a:t>
             </a:fld>
             <a:endParaRPr lang="en-US"/>
           </a:p>
@@ -669,7 +667,7 @@
           <a:p>
             <a:fld id="{492BE7D4-8037-4E12-A2D9-2553F853E8F1}" type="datetimeFigureOut">
               <a:rPr lang="en-US" smtClean="0"/>
-              <a:t>3/15/2022</a:t>
+              <a:t>3/21/2022</a:t>
             </a:fld>
             <a:endParaRPr lang="en-US"/>
           </a:p>
@@ -867,7 +865,7 @@
           <a:p>
             <a:fld id="{492BE7D4-8037-4E12-A2D9-2553F853E8F1}" type="datetimeFigureOut">
               <a:rPr lang="en-US" smtClean="0"/>
-              <a:t>3/15/2022</a:t>
+              <a:t>3/21/2022</a:t>
             </a:fld>
             <a:endParaRPr lang="en-US"/>
           </a:p>
@@ -1142,7 +1140,7 @@
           <a:p>
             <a:fld id="{492BE7D4-8037-4E12-A2D9-2553F853E8F1}" type="datetimeFigureOut">
               <a:rPr lang="en-US" smtClean="0"/>
-              <a:t>3/15/2022</a:t>
+              <a:t>3/21/2022</a:t>
             </a:fld>
             <a:endParaRPr lang="en-US"/>
           </a:p>
@@ -1407,7 +1405,7 @@
           <a:p>
             <a:fld id="{492BE7D4-8037-4E12-A2D9-2553F853E8F1}" type="datetimeFigureOut">
               <a:rPr lang="en-US" smtClean="0"/>
-              <a:t>3/15/2022</a:t>
+              <a:t>3/21/2022</a:t>
             </a:fld>
             <a:endParaRPr lang="en-US"/>
           </a:p>
@@ -1819,7 +1817,7 @@
           <a:p>
             <a:fld id="{492BE7D4-8037-4E12-A2D9-2553F853E8F1}" type="datetimeFigureOut">
               <a:rPr lang="en-US" smtClean="0"/>
-              <a:t>3/15/2022</a:t>
+              <a:t>3/21/2022</a:t>
             </a:fld>
             <a:endParaRPr lang="en-US"/>
           </a:p>
@@ -1960,7 +1958,7 @@
           <a:p>
             <a:fld id="{492BE7D4-8037-4E12-A2D9-2553F853E8F1}" type="datetimeFigureOut">
               <a:rPr lang="en-US" smtClean="0"/>
-              <a:t>3/15/2022</a:t>
+              <a:t>3/21/2022</a:t>
             </a:fld>
             <a:endParaRPr lang="en-US"/>
           </a:p>
@@ -2073,7 +2071,7 @@
           <a:p>
             <a:fld id="{492BE7D4-8037-4E12-A2D9-2553F853E8F1}" type="datetimeFigureOut">
               <a:rPr lang="en-US" smtClean="0"/>
-              <a:t>3/15/2022</a:t>
+              <a:t>3/21/2022</a:t>
             </a:fld>
             <a:endParaRPr lang="en-US"/>
           </a:p>
@@ -2384,7 +2382,7 @@
           <a:p>
             <a:fld id="{492BE7D4-8037-4E12-A2D9-2553F853E8F1}" type="datetimeFigureOut">
               <a:rPr lang="en-US" smtClean="0"/>
-              <a:t>3/15/2022</a:t>
+              <a:t>3/21/2022</a:t>
             </a:fld>
             <a:endParaRPr lang="en-US"/>
           </a:p>
@@ -2672,7 +2670,7 @@
           <a:p>
             <a:fld id="{492BE7D4-8037-4E12-A2D9-2553F853E8F1}" type="datetimeFigureOut">
               <a:rPr lang="en-US" smtClean="0"/>
-              <a:t>3/15/2022</a:t>
+              <a:t>3/21/2022</a:t>
             </a:fld>
             <a:endParaRPr lang="en-US"/>
           </a:p>
@@ -2913,7 +2911,7 @@
           <a:p>
             <a:fld id="{492BE7D4-8037-4E12-A2D9-2553F853E8F1}" type="datetimeFigureOut">
               <a:rPr lang="en-US" smtClean="0"/>
-              <a:t>3/15/2022</a:t>
+              <a:t>3/21/2022</a:t>
             </a:fld>
             <a:endParaRPr lang="en-US"/>
           </a:p>
@@ -3332,10 +3330,10 @@
       </p:grpSpPr>
       <p:pic>
         <p:nvPicPr>
-          <p:cNvPr id="3" name="Picture 2" descr="Chart, line chart&#10;&#10;Description automatically generated">
-            <a:extLst>
-              <a:ext uri="{FF2B5EF4-FFF2-40B4-BE49-F238E27FC236}">
-                <a16:creationId xmlns:a16="http://schemas.microsoft.com/office/drawing/2014/main" id="{9A2440D0-A3DB-42FA-BF1F-D34BD9CB0077}"/>
+          <p:cNvPr id="13" name="Picture 12" descr="Chart, histogram&#10;&#10;Description automatically generated">
+            <a:extLst>
+              <a:ext uri="{FF2B5EF4-FFF2-40B4-BE49-F238E27FC236}">
+                <a16:creationId xmlns:a16="http://schemas.microsoft.com/office/drawing/2014/main" id="{DC86CE6E-5325-407A-BF53-7463A32CA12A}"/>
               </a:ext>
             </a:extLst>
           </p:cNvPr>
@@ -3358,8 +3356,8 @@
         </p:blipFill>
         <p:spPr>
           <a:xfrm>
-            <a:off x="1950097" y="70684"/>
-            <a:ext cx="8142159" cy="3283669"/>
+            <a:off x="1988288" y="3204951"/>
+            <a:ext cx="8088773" cy="3576237"/>
           </a:xfrm>
           <a:prstGeom prst="rect">
             <a:avLst/>
@@ -3368,10 +3366,10 @@
       </p:pic>
       <p:pic>
         <p:nvPicPr>
-          <p:cNvPr id="13" name="Picture 12" descr="Chart, histogram&#10;&#10;Description automatically generated">
-            <a:extLst>
-              <a:ext uri="{FF2B5EF4-FFF2-40B4-BE49-F238E27FC236}">
-                <a16:creationId xmlns:a16="http://schemas.microsoft.com/office/drawing/2014/main" id="{DC86CE6E-5325-407A-BF53-7463A32CA12A}"/>
+          <p:cNvPr id="6" name="Picture 5" descr="Chart, line chart&#10;&#10;Description automatically generated">
+            <a:extLst>
+              <a:ext uri="{FF2B5EF4-FFF2-40B4-BE49-F238E27FC236}">
+                <a16:creationId xmlns:a16="http://schemas.microsoft.com/office/drawing/2014/main" id="{379FC4E6-295E-4832-AB10-A9B7947C71EF}"/>
               </a:ext>
             </a:extLst>
           </p:cNvPr>
@@ -3394,14 +3392,100 @@
         </p:blipFill>
         <p:spPr>
           <a:xfrm>
-            <a:off x="1988287" y="3204361"/>
-            <a:ext cx="8103969" cy="3582955"/>
+            <a:off x="1950095" y="76812"/>
+            <a:ext cx="8123114" cy="3275988"/>
           </a:xfrm>
           <a:prstGeom prst="rect">
             <a:avLst/>
           </a:prstGeom>
         </p:spPr>
       </p:pic>
+      <p:sp>
+        <p:nvSpPr>
+          <p:cNvPr id="2" name="TextBox 1">
+            <a:extLst>
+              <a:ext uri="{FF2B5EF4-FFF2-40B4-BE49-F238E27FC236}">
+                <a16:creationId xmlns:a16="http://schemas.microsoft.com/office/drawing/2014/main" id="{128AEF00-45F3-435E-B0E2-00DA664D9569}"/>
+              </a:ext>
+            </a:extLst>
+          </p:cNvPr>
+          <p:cNvSpPr txBox="1"/>
+          <p:nvPr/>
+        </p:nvSpPr>
+        <p:spPr>
+          <a:xfrm>
+            <a:off x="2506717" y="274062"/>
+            <a:ext cx="3810956" cy="276999"/>
+          </a:xfrm>
+          <a:prstGeom prst="rect">
+            <a:avLst/>
+          </a:prstGeom>
+          <a:noFill/>
+        </p:spPr>
+        <p:txBody>
+          <a:bodyPr wrap="square" rtlCol="0">
+            <a:spAutoFit/>
+          </a:bodyPr>
+          <a:lstStyle/>
+          <a:p>
+            <a:r>
+              <a:rPr lang="en-US" sz="1200" b="1" dirty="0">
+                <a:solidFill>
+                  <a:schemeClr val="tx1">
+                    <a:lumMod val="85000"/>
+                    <a:lumOff val="15000"/>
+                  </a:schemeClr>
+                </a:solidFill>
+                <a:latin typeface="DejaVu Sans"/>
+              </a:rPr>
+              <a:t>(a) SSD1 and SSD4 Electron Flux vs Time</a:t>
+            </a:r>
+          </a:p>
+        </p:txBody>
+      </p:sp>
+      <p:sp>
+        <p:nvSpPr>
+          <p:cNvPr id="7" name="TextBox 6">
+            <a:extLst>
+              <a:ext uri="{FF2B5EF4-FFF2-40B4-BE49-F238E27FC236}">
+                <a16:creationId xmlns:a16="http://schemas.microsoft.com/office/drawing/2014/main" id="{8F5B05AC-3A67-40A3-B0C9-CB6B218146FF}"/>
+              </a:ext>
+            </a:extLst>
+          </p:cNvPr>
+          <p:cNvSpPr txBox="1"/>
+          <p:nvPr/>
+        </p:nvSpPr>
+        <p:spPr>
+          <a:xfrm>
+            <a:off x="2506717" y="3238936"/>
+            <a:ext cx="3404556" cy="276999"/>
+          </a:xfrm>
+          <a:prstGeom prst="rect">
+            <a:avLst/>
+          </a:prstGeom>
+          <a:noFill/>
+        </p:spPr>
+        <p:txBody>
+          <a:bodyPr wrap="square" rtlCol="0">
+            <a:spAutoFit/>
+          </a:bodyPr>
+          <a:lstStyle/>
+          <a:p>
+            <a:r>
+              <a:rPr lang="en-US" sz="1200" b="1" dirty="0">
+                <a:solidFill>
+                  <a:schemeClr val="tx1">
+                    <a:lumMod val="85000"/>
+                    <a:lumOff val="15000"/>
+                  </a:schemeClr>
+                </a:solidFill>
+                <a:latin typeface="DejaVu Sans"/>
+              </a:rPr>
+              <a:t>(b) Isotropy Index vs Time</a:t>
+            </a:r>
+          </a:p>
+        </p:txBody>
+      </p:sp>
     </p:spTree>
     <p:extLst>
       <p:ext uri="{BB962C8B-B14F-4D97-AF65-F5344CB8AC3E}">
@@ -3434,10 +3518,10 @@
       </p:grpSpPr>
       <p:pic>
         <p:nvPicPr>
-          <p:cNvPr id="5" name="Picture 4" descr="Chart&#10;&#10;Description automatically generated">
-            <a:extLst>
-              <a:ext uri="{FF2B5EF4-FFF2-40B4-BE49-F238E27FC236}">
-                <a16:creationId xmlns:a16="http://schemas.microsoft.com/office/drawing/2014/main" id="{72757325-C544-4A24-8ADE-F1173A356457}"/>
+          <p:cNvPr id="12" name="Picture 11" descr="Chart, box and whisker chart&#10;&#10;Description automatically generated">
+            <a:extLst>
+              <a:ext uri="{FF2B5EF4-FFF2-40B4-BE49-F238E27FC236}">
+                <a16:creationId xmlns:a16="http://schemas.microsoft.com/office/drawing/2014/main" id="{5208F915-A20E-463A-AC14-455A52C40CD8}"/>
               </a:ext>
             </a:extLst>
           </p:cNvPr>
@@ -3446,7 +3530,7 @@
           </p:cNvPicPr>
           <p:nvPr/>
         </p:nvPicPr>
-        <p:blipFill rotWithShape="1">
+        <p:blipFill>
           <a:blip r:embed="rId2">
             <a:extLst>
               <a:ext uri="{28A0092B-C50C-407E-A947-70E740481C1C}">
@@ -3454,13 +3538,14 @@
               </a:ext>
             </a:extLst>
           </a:blip>
-          <a:srcRect l="10159" t="10333"/>
-          <a:stretch/>
+          <a:stretch>
+            <a:fillRect/>
+          </a:stretch>
         </p:blipFill>
         <p:spPr>
           <a:xfrm>
-            <a:off x="5511487" y="267871"/>
-            <a:ext cx="4204978" cy="3364120"/>
+            <a:off x="4169990" y="1883004"/>
+            <a:ext cx="3799911" cy="2907758"/>
           </a:xfrm>
           <a:prstGeom prst="rect">
             <a:avLst/>
@@ -3469,10 +3554,10 @@
       </p:pic>
       <p:pic>
         <p:nvPicPr>
-          <p:cNvPr id="7" name="Picture 6" descr="Chart, sunburst chart&#10;&#10;Description automatically generated">
-            <a:extLst>
-              <a:ext uri="{FF2B5EF4-FFF2-40B4-BE49-F238E27FC236}">
-                <a16:creationId xmlns:a16="http://schemas.microsoft.com/office/drawing/2014/main" id="{4C53B0DF-F4FC-49EC-AC15-E1A13243FBC1}"/>
+          <p:cNvPr id="14" name="Picture 13" descr="Chart, box and whisker chart&#10;&#10;Description automatically generated">
+            <a:extLst>
+              <a:ext uri="{FF2B5EF4-FFF2-40B4-BE49-F238E27FC236}">
+                <a16:creationId xmlns:a16="http://schemas.microsoft.com/office/drawing/2014/main" id="{766D276A-91F2-4A1D-A59F-C9BC7ED82A30}"/>
               </a:ext>
             </a:extLst>
           </p:cNvPr>
@@ -3481,7 +3566,7 @@
           </p:cNvPicPr>
           <p:nvPr/>
         </p:nvPicPr>
-        <p:blipFill rotWithShape="1">
+        <p:blipFill>
           <a:blip r:embed="rId3">
             <a:extLst>
               <a:ext uri="{28A0092B-C50C-407E-A947-70E740481C1C}">
@@ -3489,13 +3574,14 @@
               </a:ext>
             </a:extLst>
           </a:blip>
-          <a:srcRect t="7902" b="1288"/>
-          <a:stretch/>
+          <a:stretch>
+            <a:fillRect/>
+          </a:stretch>
         </p:blipFill>
         <p:spPr>
           <a:xfrm>
-            <a:off x="5363112" y="3513368"/>
-            <a:ext cx="4204978" cy="2991181"/>
+            <a:off x="65988" y="1883004"/>
+            <a:ext cx="4169990" cy="2907758"/>
           </a:xfrm>
           <a:prstGeom prst="rect">
             <a:avLst/>
@@ -3504,10 +3590,10 @@
       </p:pic>
       <p:pic>
         <p:nvPicPr>
-          <p:cNvPr id="9" name="Picture 8" descr="Chart, sunburst chart&#10;&#10;Description automatically generated">
-            <a:extLst>
-              <a:ext uri="{FF2B5EF4-FFF2-40B4-BE49-F238E27FC236}">
-                <a16:creationId xmlns:a16="http://schemas.microsoft.com/office/drawing/2014/main" id="{2ACF979C-72C0-4CD5-BE46-4E2EA0B586CA}"/>
+          <p:cNvPr id="16" name="Picture 15" descr="Chart, box and whisker chart&#10;&#10;Description automatically generated">
+            <a:extLst>
+              <a:ext uri="{FF2B5EF4-FFF2-40B4-BE49-F238E27FC236}">
+                <a16:creationId xmlns:a16="http://schemas.microsoft.com/office/drawing/2014/main" id="{43B86CBD-2BD0-4002-817B-B13DB6606CE9}"/>
               </a:ext>
             </a:extLst>
           </p:cNvPr>
@@ -3516,7 +3602,7 @@
           </p:cNvPicPr>
           <p:nvPr/>
         </p:nvPicPr>
-        <p:blipFill rotWithShape="1">
+        <p:blipFill>
           <a:blip r:embed="rId4">
             <a:extLst>
               <a:ext uri="{28A0092B-C50C-407E-A947-70E740481C1C}">
@@ -3524,58 +3610,153 @@
               </a:ext>
             </a:extLst>
           </a:blip>
-          <a:srcRect t="5594" b="-1"/>
-          <a:stretch/>
+          <a:stretch>
+            <a:fillRect/>
+          </a:stretch>
         </p:blipFill>
         <p:spPr>
           <a:xfrm>
-            <a:off x="1898779" y="352239"/>
-            <a:ext cx="3691464" cy="3076761"/>
+            <a:off x="7883824" y="1883004"/>
+            <a:ext cx="4117121" cy="2907758"/>
           </a:xfrm>
           <a:prstGeom prst="rect">
             <a:avLst/>
           </a:prstGeom>
         </p:spPr>
       </p:pic>
-      <p:pic>
-        <p:nvPicPr>
-          <p:cNvPr id="11" name="Picture 10" descr="Chart, sunburst chart&#10;&#10;Description automatically generated">
-            <a:extLst>
-              <a:ext uri="{FF2B5EF4-FFF2-40B4-BE49-F238E27FC236}">
-                <a16:creationId xmlns:a16="http://schemas.microsoft.com/office/drawing/2014/main" id="{D4828E51-C4A8-4899-9FE9-315459A24E6E}"/>
-              </a:ext>
-            </a:extLst>
-          </p:cNvPr>
-          <p:cNvPicPr>
-            <a:picLocks noChangeAspect="1"/>
-          </p:cNvPicPr>
+      <p:sp>
+        <p:nvSpPr>
+          <p:cNvPr id="5" name="TextBox 4">
+            <a:extLst>
+              <a:ext uri="{FF2B5EF4-FFF2-40B4-BE49-F238E27FC236}">
+                <a16:creationId xmlns:a16="http://schemas.microsoft.com/office/drawing/2014/main" id="{55A05169-D290-4790-BCDF-637CBEAD1511}"/>
+              </a:ext>
+            </a:extLst>
+          </p:cNvPr>
+          <p:cNvSpPr txBox="1"/>
           <p:nvPr/>
-        </p:nvPicPr>
-        <p:blipFill rotWithShape="1">
-          <a:blip r:embed="rId5">
-            <a:extLst>
-              <a:ext uri="{28A0092B-C50C-407E-A947-70E740481C1C}">
-                <a14:useLocalDpi xmlns:a14="http://schemas.microsoft.com/office/drawing/2010/main" val="0"/>
-              </a:ext>
-            </a:extLst>
-          </a:blip>
-          <a:srcRect t="9437" b="3991"/>
-          <a:stretch/>
-        </p:blipFill>
+        </p:nvSpPr>
         <p:spPr>
           <a:xfrm>
-            <a:off x="1345113" y="3470937"/>
-            <a:ext cx="4427531" cy="3203066"/>
+            <a:off x="444653" y="2037548"/>
+            <a:ext cx="693683" cy="276999"/>
           </a:xfrm>
           <a:prstGeom prst="rect">
             <a:avLst/>
           </a:prstGeom>
+          <a:noFill/>
         </p:spPr>
-      </p:pic>
+        <p:txBody>
+          <a:bodyPr wrap="square" rtlCol="0">
+            <a:spAutoFit/>
+          </a:bodyPr>
+          <a:lstStyle/>
+          <a:p>
+            <a:r>
+              <a:rPr lang="en-US" sz="1200" b="1" dirty="0">
+                <a:solidFill>
+                  <a:schemeClr val="tx1">
+                    <a:lumMod val="85000"/>
+                    <a:lumOff val="15000"/>
+                  </a:schemeClr>
+                </a:solidFill>
+                <a:latin typeface="DejaVu Sans"/>
+              </a:rPr>
+              <a:t>(a)</a:t>
+            </a:r>
+          </a:p>
+        </p:txBody>
+      </p:sp>
+      <p:sp>
+        <p:nvSpPr>
+          <p:cNvPr id="6" name="TextBox 5">
+            <a:extLst>
+              <a:ext uri="{FF2B5EF4-FFF2-40B4-BE49-F238E27FC236}">
+                <a16:creationId xmlns:a16="http://schemas.microsoft.com/office/drawing/2014/main" id="{6B683155-0966-4668-B2FC-E7378CDF2F2B}"/>
+              </a:ext>
+            </a:extLst>
+          </p:cNvPr>
+          <p:cNvSpPr txBox="1"/>
+          <p:nvPr/>
+        </p:nvSpPr>
+        <p:spPr>
+          <a:xfrm>
+            <a:off x="4169990" y="2037545"/>
+            <a:ext cx="693683" cy="276999"/>
+          </a:xfrm>
+          <a:prstGeom prst="rect">
+            <a:avLst/>
+          </a:prstGeom>
+          <a:noFill/>
+        </p:spPr>
+        <p:txBody>
+          <a:bodyPr wrap="square" rtlCol="0">
+            <a:spAutoFit/>
+          </a:bodyPr>
+          <a:lstStyle/>
+          <a:p>
+            <a:r>
+              <a:rPr lang="en-US" sz="1200" b="1" dirty="0">
+                <a:solidFill>
+                  <a:schemeClr val="tx1">
+                    <a:lumMod val="85000"/>
+                    <a:lumOff val="15000"/>
+                  </a:schemeClr>
+                </a:solidFill>
+                <a:latin typeface="DejaVu Sans"/>
+              </a:rPr>
+              <a:t>(b)</a:t>
+            </a:r>
+          </a:p>
+        </p:txBody>
+      </p:sp>
+      <p:sp>
+        <p:nvSpPr>
+          <p:cNvPr id="7" name="TextBox 6">
+            <a:extLst>
+              <a:ext uri="{FF2B5EF4-FFF2-40B4-BE49-F238E27FC236}">
+                <a16:creationId xmlns:a16="http://schemas.microsoft.com/office/drawing/2014/main" id="{65121CF6-06E0-4F1D-9A06-731E3CDC25C4}"/>
+              </a:ext>
+            </a:extLst>
+          </p:cNvPr>
+          <p:cNvSpPr txBox="1"/>
+          <p:nvPr/>
+        </p:nvSpPr>
+        <p:spPr>
+          <a:xfrm>
+            <a:off x="8193344" y="2037546"/>
+            <a:ext cx="693683" cy="276999"/>
+          </a:xfrm>
+          <a:prstGeom prst="rect">
+            <a:avLst/>
+          </a:prstGeom>
+          <a:noFill/>
+        </p:spPr>
+        <p:txBody>
+          <a:bodyPr wrap="square" rtlCol="0">
+            <a:spAutoFit/>
+          </a:bodyPr>
+          <a:lstStyle/>
+          <a:p>
+            <a:r>
+              <a:rPr lang="en-US" sz="1200" b="1" dirty="0">
+                <a:solidFill>
+                  <a:schemeClr val="tx1">
+                    <a:lumMod val="85000"/>
+                    <a:lumOff val="15000"/>
+                  </a:schemeClr>
+                </a:solidFill>
+                <a:latin typeface="DejaVu Sans"/>
+              </a:rPr>
+              <a:t>(c)</a:t>
+            </a:r>
+          </a:p>
+        </p:txBody>
+      </p:sp>
     </p:spTree>
     <p:extLst>
       <p:ext uri="{BB962C8B-B14F-4D97-AF65-F5344CB8AC3E}">
-        <p14:creationId xmlns:p14="http://schemas.microsoft.com/office/powerpoint/2010/main" val="2138943883"/>
+        <p14:creationId xmlns:p14="http://schemas.microsoft.com/office/powerpoint/2010/main" val="2971433207"/>
       </p:ext>
     </p:extLst>
   </p:cSld>
@@ -3604,10 +3785,10 @@
       </p:grpSpPr>
       <p:pic>
         <p:nvPicPr>
-          <p:cNvPr id="12" name="Picture 11" descr="Chart, box and whisker chart&#10;&#10;Description automatically generated">
-            <a:extLst>
-              <a:ext uri="{FF2B5EF4-FFF2-40B4-BE49-F238E27FC236}">
-                <a16:creationId xmlns:a16="http://schemas.microsoft.com/office/drawing/2014/main" id="{5208F915-A20E-463A-AC14-455A52C40CD8}"/>
+          <p:cNvPr id="7" name="Picture 6" descr="Graphical user interface, chart&#10;&#10;Description automatically generated">
+            <a:extLst>
+              <a:ext uri="{FF2B5EF4-FFF2-40B4-BE49-F238E27FC236}">
+                <a16:creationId xmlns:a16="http://schemas.microsoft.com/office/drawing/2014/main" id="{B89B1925-939D-40C8-9405-B377C6D6E4EB}"/>
               </a:ext>
             </a:extLst>
           </p:cNvPr>
@@ -3630,8 +3811,8 @@
         </p:blipFill>
         <p:spPr>
           <a:xfrm>
-            <a:off x="4169990" y="1883004"/>
-            <a:ext cx="3799911" cy="2907758"/>
+            <a:off x="39095" y="3023116"/>
+            <a:ext cx="4324757" cy="2265186"/>
           </a:xfrm>
           <a:prstGeom prst="rect">
             <a:avLst/>
@@ -3640,10 +3821,10 @@
       </p:pic>
       <p:pic>
         <p:nvPicPr>
-          <p:cNvPr id="14" name="Picture 13" descr="Chart, box and whisker chart&#10;&#10;Description automatically generated">
-            <a:extLst>
-              <a:ext uri="{FF2B5EF4-FFF2-40B4-BE49-F238E27FC236}">
-                <a16:creationId xmlns:a16="http://schemas.microsoft.com/office/drawing/2014/main" id="{766D276A-91F2-4A1D-A59F-C9BC7ED82A30}"/>
+          <p:cNvPr id="3" name="Picture 2" descr="Chart, line chart&#10;&#10;Description automatically generated">
+            <a:extLst>
+              <a:ext uri="{FF2B5EF4-FFF2-40B4-BE49-F238E27FC236}">
+                <a16:creationId xmlns:a16="http://schemas.microsoft.com/office/drawing/2014/main" id="{E547B49A-8DC1-4DF5-A027-FBAF756655C4}"/>
               </a:ext>
             </a:extLst>
           </p:cNvPr>
@@ -3666,8 +3847,8 @@
         </p:blipFill>
         <p:spPr>
           <a:xfrm>
-            <a:off x="65988" y="1883004"/>
-            <a:ext cx="4169990" cy="2907758"/>
+            <a:off x="34867" y="754476"/>
+            <a:ext cx="4331353" cy="2268641"/>
           </a:xfrm>
           <a:prstGeom prst="rect">
             <a:avLst/>
@@ -3676,76 +3857,10 @@
       </p:pic>
       <p:pic>
         <p:nvPicPr>
-          <p:cNvPr id="16" name="Picture 15" descr="Chart, box and whisker chart&#10;&#10;Description automatically generated">
-            <a:extLst>
-              <a:ext uri="{FF2B5EF4-FFF2-40B4-BE49-F238E27FC236}">
-                <a16:creationId xmlns:a16="http://schemas.microsoft.com/office/drawing/2014/main" id="{43B86CBD-2BD0-4002-817B-B13DB6606CE9}"/>
-              </a:ext>
-            </a:extLst>
-          </p:cNvPr>
-          <p:cNvPicPr>
-            <a:picLocks noChangeAspect="1"/>
-          </p:cNvPicPr>
-          <p:nvPr/>
-        </p:nvPicPr>
-        <p:blipFill>
-          <a:blip r:embed="rId4">
-            <a:extLst>
-              <a:ext uri="{28A0092B-C50C-407E-A947-70E740481C1C}">
-                <a14:useLocalDpi xmlns:a14="http://schemas.microsoft.com/office/drawing/2010/main" val="0"/>
-              </a:ext>
-            </a:extLst>
-          </a:blip>
-          <a:stretch>
-            <a:fillRect/>
-          </a:stretch>
-        </p:blipFill>
-        <p:spPr>
-          <a:xfrm>
-            <a:off x="7883824" y="1883004"/>
-            <a:ext cx="4117121" cy="2907758"/>
-          </a:xfrm>
-          <a:prstGeom prst="rect">
-            <a:avLst/>
-          </a:prstGeom>
-        </p:spPr>
-      </p:pic>
-    </p:spTree>
-    <p:extLst>
-      <p:ext uri="{BB962C8B-B14F-4D97-AF65-F5344CB8AC3E}">
-        <p14:creationId xmlns:p14="http://schemas.microsoft.com/office/powerpoint/2010/main" val="2971433207"/>
-      </p:ext>
-    </p:extLst>
-  </p:cSld>
-  <p:clrMapOvr>
-    <a:masterClrMapping/>
-  </p:clrMapOvr>
-</p:sld>
-</file>
-
-<file path=ppt/slides/slide4.xml><?xml version="1.0" encoding="utf-8"?>
-<p:sld xmlns:a="http://schemas.openxmlformats.org/drawingml/2006/main" xmlns:r="http://schemas.openxmlformats.org/officeDocument/2006/relationships" xmlns:p="http://schemas.openxmlformats.org/presentationml/2006/main">
-  <p:cSld>
-    <p:spTree>
-      <p:nvGrpSpPr>
-        <p:cNvPr id="1" name=""/>
-        <p:cNvGrpSpPr/>
-        <p:nvPr/>
-      </p:nvGrpSpPr>
-      <p:grpSpPr>
-        <a:xfrm>
-          <a:off x="0" y="0"/>
-          <a:ext cx="0" cy="0"/>
-          <a:chOff x="0" y="0"/>
-          <a:chExt cx="0" cy="0"/>
-        </a:xfrm>
-      </p:grpSpPr>
-      <p:pic>
-        <p:nvPicPr>
-          <p:cNvPr id="4" name="Picture 3" descr="Chart, box and whisker chart&#10;&#10;Description automatically generated">
-            <a:extLst>
-              <a:ext uri="{FF2B5EF4-FFF2-40B4-BE49-F238E27FC236}">
-                <a16:creationId xmlns:a16="http://schemas.microsoft.com/office/drawing/2014/main" id="{D4B4B304-3EA9-405E-95DF-0AB4F8883A71}"/>
+          <p:cNvPr id="6" name="Picture 5" descr="Chart, line chart&#10;&#10;Description automatically generated">
+            <a:extLst>
+              <a:ext uri="{FF2B5EF4-FFF2-40B4-BE49-F238E27FC236}">
+                <a16:creationId xmlns:a16="http://schemas.microsoft.com/office/drawing/2014/main" id="{3E21F7FF-3754-40E3-A20D-050E81BC4CFF}"/>
               </a:ext>
             </a:extLst>
           </p:cNvPr>
@@ -3755,20 +3870,20 @@
           <p:nvPr/>
         </p:nvPicPr>
         <p:blipFill rotWithShape="1">
-          <a:blip r:embed="rId2">
+          <a:blip r:embed="rId4">
             <a:extLst>
               <a:ext uri="{28A0092B-C50C-407E-A947-70E740481C1C}">
                 <a14:useLocalDpi xmlns:a14="http://schemas.microsoft.com/office/drawing/2010/main" val="0"/>
               </a:ext>
             </a:extLst>
           </a:blip>
-          <a:srcRect b="5256"/>
+          <a:srcRect l="10038"/>
           <a:stretch/>
         </p:blipFill>
         <p:spPr>
           <a:xfrm>
-            <a:off x="131221" y="1087644"/>
-            <a:ext cx="6069609" cy="4221473"/>
+            <a:off x="4376057" y="754477"/>
+            <a:ext cx="3865701" cy="2268641"/>
           </a:xfrm>
           <a:prstGeom prst="rect">
             <a:avLst/>
@@ -3777,10 +3892,10 @@
       </p:pic>
       <p:pic>
         <p:nvPicPr>
-          <p:cNvPr id="5" name="Picture 4" descr="Chart, box and whisker chart&#10;&#10;Description automatically generated">
-            <a:extLst>
-              <a:ext uri="{FF2B5EF4-FFF2-40B4-BE49-F238E27FC236}">
-                <a16:creationId xmlns:a16="http://schemas.microsoft.com/office/drawing/2014/main" id="{74E580C8-ADCE-438A-B0B4-016468F405DD}"/>
+          <p:cNvPr id="8" name="Picture 7" descr="Chart, line chart&#10;&#10;Description automatically generated">
+            <a:extLst>
+              <a:ext uri="{FF2B5EF4-FFF2-40B4-BE49-F238E27FC236}">
+                <a16:creationId xmlns:a16="http://schemas.microsoft.com/office/drawing/2014/main" id="{77AC03B0-AF04-4738-B89C-8AC09EB3D1E7}"/>
               </a:ext>
             </a:extLst>
           </p:cNvPr>
@@ -3790,86 +3905,20 @@
           <p:nvPr/>
         </p:nvPicPr>
         <p:blipFill rotWithShape="1">
-          <a:blip r:embed="rId3">
+          <a:blip r:embed="rId5">
             <a:extLst>
               <a:ext uri="{28A0092B-C50C-407E-A947-70E740481C1C}">
                 <a14:useLocalDpi xmlns:a14="http://schemas.microsoft.com/office/drawing/2010/main" val="0"/>
               </a:ext>
             </a:extLst>
           </a:blip>
-          <a:srcRect l="7747" b="5256"/>
+          <a:srcRect l="10017"/>
           <a:stretch/>
         </p:blipFill>
         <p:spPr>
           <a:xfrm>
-            <a:off x="6200830" y="1087645"/>
-            <a:ext cx="5599395" cy="4221473"/>
-          </a:xfrm>
-          <a:prstGeom prst="rect">
-            <a:avLst/>
-          </a:prstGeom>
-        </p:spPr>
-      </p:pic>
-    </p:spTree>
-    <p:extLst>
-      <p:ext uri="{BB962C8B-B14F-4D97-AF65-F5344CB8AC3E}">
-        <p14:creationId xmlns:p14="http://schemas.microsoft.com/office/powerpoint/2010/main" val="4246931480"/>
-      </p:ext>
-    </p:extLst>
-  </p:cSld>
-  <p:clrMapOvr>
-    <a:masterClrMapping/>
-  </p:clrMapOvr>
-</p:sld>
-</file>
-
-<file path=ppt/slides/slide5.xml><?xml version="1.0" encoding="utf-8"?>
-<p:sld xmlns:a="http://schemas.openxmlformats.org/drawingml/2006/main" xmlns:r="http://schemas.openxmlformats.org/officeDocument/2006/relationships" xmlns:p="http://schemas.openxmlformats.org/presentationml/2006/main">
-  <p:cSld>
-    <p:spTree>
-      <p:nvGrpSpPr>
-        <p:cNvPr id="1" name=""/>
-        <p:cNvGrpSpPr/>
-        <p:nvPr/>
-      </p:nvGrpSpPr>
-      <p:grpSpPr>
-        <a:xfrm>
-          <a:off x="0" y="0"/>
-          <a:ext cx="0" cy="0"/>
-          <a:chOff x="0" y="0"/>
-          <a:chExt cx="0" cy="0"/>
-        </a:xfrm>
-      </p:grpSpPr>
-      <p:pic>
-        <p:nvPicPr>
-          <p:cNvPr id="10" name="Picture 9" descr="Graphical user interface, chart, line chart&#10;&#10;Description automatically generated">
-            <a:extLst>
-              <a:ext uri="{FF2B5EF4-FFF2-40B4-BE49-F238E27FC236}">
-                <a16:creationId xmlns:a16="http://schemas.microsoft.com/office/drawing/2014/main" id="{A618FE88-F220-4400-85CC-FEEADE30EDB6}"/>
-              </a:ext>
-            </a:extLst>
-          </p:cNvPr>
-          <p:cNvPicPr>
-            <a:picLocks noChangeAspect="1"/>
-          </p:cNvPicPr>
-          <p:nvPr/>
-        </p:nvPicPr>
-        <p:blipFill>
-          <a:blip r:embed="rId2">
-            <a:extLst>
-              <a:ext uri="{28A0092B-C50C-407E-A947-70E740481C1C}">
-                <a14:useLocalDpi xmlns:a14="http://schemas.microsoft.com/office/drawing/2010/main" val="0"/>
-              </a:ext>
-            </a:extLst>
-          </a:blip>
-          <a:stretch>
-            <a:fillRect/>
-          </a:stretch>
-        </p:blipFill>
-        <p:spPr>
-          <a:xfrm>
-            <a:off x="7744486" y="184471"/>
-            <a:ext cx="3995902" cy="2092941"/>
+            <a:off x="8261431" y="754476"/>
+            <a:ext cx="3897481" cy="2268641"/>
           </a:xfrm>
           <a:prstGeom prst="rect">
             <a:avLst/>
@@ -3878,10 +3927,10 @@
       </p:pic>
       <p:pic>
         <p:nvPicPr>
-          <p:cNvPr id="23" name="Picture 22" descr="Graphical user interface, chart, scatter chart&#10;&#10;Description automatically generated">
-            <a:extLst>
-              <a:ext uri="{FF2B5EF4-FFF2-40B4-BE49-F238E27FC236}">
-                <a16:creationId xmlns:a16="http://schemas.microsoft.com/office/drawing/2014/main" id="{103253BD-DC6F-499E-B022-B780AB752896}"/>
+          <p:cNvPr id="13" name="Picture 12" descr="Chart, line chart, scatter chart&#10;&#10;Description automatically generated">
+            <a:extLst>
+              <a:ext uri="{FF2B5EF4-FFF2-40B4-BE49-F238E27FC236}">
+                <a16:creationId xmlns:a16="http://schemas.microsoft.com/office/drawing/2014/main" id="{9FCD2A06-DA7F-437E-812C-7C2666346D7D}"/>
               </a:ext>
             </a:extLst>
           </p:cNvPr>
@@ -3890,22 +3939,21 @@
           </p:cNvPicPr>
           <p:nvPr/>
         </p:nvPicPr>
-        <p:blipFill>
-          <a:blip r:embed="rId3">
+        <p:blipFill rotWithShape="1">
+          <a:blip r:embed="rId6">
             <a:extLst>
               <a:ext uri="{28A0092B-C50C-407E-A947-70E740481C1C}">
                 <a14:useLocalDpi xmlns:a14="http://schemas.microsoft.com/office/drawing/2010/main" val="0"/>
               </a:ext>
             </a:extLst>
           </a:blip>
-          <a:stretch>
-            <a:fillRect/>
-          </a:stretch>
+          <a:srcRect l="9754"/>
+          <a:stretch/>
         </p:blipFill>
         <p:spPr>
           <a:xfrm>
-            <a:off x="7744486" y="2277412"/>
-            <a:ext cx="3995904" cy="2092942"/>
+            <a:off x="4363852" y="3023117"/>
+            <a:ext cx="3877906" cy="2268641"/>
           </a:xfrm>
           <a:prstGeom prst="rect">
             <a:avLst/>
@@ -3914,10 +3962,10 @@
       </p:pic>
       <p:pic>
         <p:nvPicPr>
-          <p:cNvPr id="17" name="Picture 16" descr="Chart, scatter chart&#10;&#10;Description automatically generated">
-            <a:extLst>
-              <a:ext uri="{FF2B5EF4-FFF2-40B4-BE49-F238E27FC236}">
-                <a16:creationId xmlns:a16="http://schemas.microsoft.com/office/drawing/2014/main" id="{BDBE5AA4-528F-4995-B90C-368B1D6CBD4C}"/>
+          <p:cNvPr id="16" name="Picture 15" descr="Chart, scatter chart&#10;&#10;Description automatically generated">
+            <a:extLst>
+              <a:ext uri="{FF2B5EF4-FFF2-40B4-BE49-F238E27FC236}">
+                <a16:creationId xmlns:a16="http://schemas.microsoft.com/office/drawing/2014/main" id="{E7C32894-BCA5-4B15-91C3-0D254EF7EBF3}"/>
               </a:ext>
             </a:extLst>
           </p:cNvPr>
@@ -3926,130 +3974,21 @@
           </p:cNvPicPr>
           <p:nvPr/>
         </p:nvPicPr>
-        <p:blipFill>
-          <a:blip r:embed="rId4">
+        <p:blipFill rotWithShape="1">
+          <a:blip r:embed="rId7">
             <a:extLst>
               <a:ext uri="{28A0092B-C50C-407E-A947-70E740481C1C}">
                 <a14:useLocalDpi xmlns:a14="http://schemas.microsoft.com/office/drawing/2010/main" val="0"/>
               </a:ext>
             </a:extLst>
           </a:blip>
-          <a:stretch>
-            <a:fillRect/>
-          </a:stretch>
+          <a:srcRect l="9845"/>
+          <a:stretch/>
         </p:blipFill>
         <p:spPr>
           <a:xfrm>
-            <a:off x="3929326" y="2266295"/>
-            <a:ext cx="3964240" cy="2092941"/>
-          </a:xfrm>
-          <a:prstGeom prst="rect">
-            <a:avLst/>
-          </a:prstGeom>
-        </p:spPr>
-      </p:pic>
-      <p:pic>
-        <p:nvPicPr>
-          <p:cNvPr id="21" name="Picture 20" descr="Chart, line chart&#10;&#10;Description automatically generated">
-            <a:extLst>
-              <a:ext uri="{FF2B5EF4-FFF2-40B4-BE49-F238E27FC236}">
-                <a16:creationId xmlns:a16="http://schemas.microsoft.com/office/drawing/2014/main" id="{3B381A2A-EB04-46B2-88FD-AD4C4E04F7CA}"/>
-              </a:ext>
-            </a:extLst>
-          </p:cNvPr>
-          <p:cNvPicPr>
-            <a:picLocks noChangeAspect="1"/>
-          </p:cNvPicPr>
-          <p:nvPr/>
-        </p:nvPicPr>
-        <p:blipFill>
-          <a:blip r:embed="rId5">
-            <a:extLst>
-              <a:ext uri="{28A0092B-C50C-407E-A947-70E740481C1C}">
-                <a14:useLocalDpi xmlns:a14="http://schemas.microsoft.com/office/drawing/2010/main" val="0"/>
-              </a:ext>
-            </a:extLst>
-          </a:blip>
-          <a:stretch>
-            <a:fillRect/>
-          </a:stretch>
-        </p:blipFill>
-        <p:spPr>
-          <a:xfrm>
-            <a:off x="3929328" y="184471"/>
-            <a:ext cx="3964238" cy="2092941"/>
-          </a:xfrm>
-          <a:prstGeom prst="rect">
-            <a:avLst/>
-          </a:prstGeom>
-        </p:spPr>
-      </p:pic>
-      <p:pic>
-        <p:nvPicPr>
-          <p:cNvPr id="3" name="Picture 2" descr="Graphical user interface, chart&#10;&#10;Description automatically generated">
-            <a:extLst>
-              <a:ext uri="{FF2B5EF4-FFF2-40B4-BE49-F238E27FC236}">
-                <a16:creationId xmlns:a16="http://schemas.microsoft.com/office/drawing/2014/main" id="{6FF2AE16-1137-48A9-A520-89A02E084FDC}"/>
-              </a:ext>
-            </a:extLst>
-          </p:cNvPr>
-          <p:cNvPicPr>
-            <a:picLocks noChangeAspect="1"/>
-          </p:cNvPicPr>
-          <p:nvPr/>
-        </p:nvPicPr>
-        <p:blipFill>
-          <a:blip r:embed="rId6">
-            <a:extLst>
-              <a:ext uri="{28A0092B-C50C-407E-A947-70E740481C1C}">
-                <a14:useLocalDpi xmlns:a14="http://schemas.microsoft.com/office/drawing/2010/main" val="0"/>
-              </a:ext>
-            </a:extLst>
-          </a:blip>
-          <a:stretch>
-            <a:fillRect/>
-          </a:stretch>
-        </p:blipFill>
-        <p:spPr>
-          <a:xfrm>
-            <a:off x="82506" y="184471"/>
-            <a:ext cx="3995902" cy="2092941"/>
-          </a:xfrm>
-          <a:prstGeom prst="rect">
-            <a:avLst/>
-          </a:prstGeom>
-        </p:spPr>
-      </p:pic>
-      <p:pic>
-        <p:nvPicPr>
-          <p:cNvPr id="14" name="Picture 13" descr="Graphical user interface, chart, histogram&#10;&#10;Description automatically generated">
-            <a:extLst>
-              <a:ext uri="{FF2B5EF4-FFF2-40B4-BE49-F238E27FC236}">
-                <a16:creationId xmlns:a16="http://schemas.microsoft.com/office/drawing/2014/main" id="{9EFA8EF3-4516-4F72-93AD-295E89741B08}"/>
-              </a:ext>
-            </a:extLst>
-          </p:cNvPr>
-          <p:cNvPicPr>
-            <a:picLocks noChangeAspect="1"/>
-          </p:cNvPicPr>
-          <p:nvPr/>
-        </p:nvPicPr>
-        <p:blipFill>
-          <a:blip r:embed="rId7">
-            <a:extLst>
-              <a:ext uri="{28A0092B-C50C-407E-A947-70E740481C1C}">
-                <a14:useLocalDpi xmlns:a14="http://schemas.microsoft.com/office/drawing/2010/main" val="0"/>
-              </a:ext>
-            </a:extLst>
-          </a:blip>
-          <a:stretch>
-            <a:fillRect/>
-          </a:stretch>
-        </p:blipFill>
-        <p:spPr>
-          <a:xfrm>
-            <a:off x="82505" y="2266294"/>
-            <a:ext cx="3995903" cy="2092941"/>
+            <a:off x="8253963" y="3023117"/>
+            <a:ext cx="3904949" cy="2268641"/>
           </a:xfrm>
           <a:prstGeom prst="rect">
             <a:avLst/>

</xml_diff>

<commit_message>
Edits to honors thesis files
</commit_message>
<xml_diff>
--- a/sampexlib/Saved Plots/Research Paper Plots/Temporary Panel Creator.pptx
+++ b/sampexlib/Saved Plots/Research Paper Plots/Temporary Panel Creator.pptx
@@ -5,9 +5,11 @@
     <p:sldMasterId id="2147483648" r:id="rId1"/>
   </p:sldMasterIdLst>
   <p:sldIdLst>
-    <p:sldId id="256" r:id="rId2"/>
-    <p:sldId id="258" r:id="rId3"/>
-    <p:sldId id="259" r:id="rId4"/>
+    <p:sldId id="260" r:id="rId2"/>
+    <p:sldId id="261" r:id="rId3"/>
+    <p:sldId id="256" r:id="rId4"/>
+    <p:sldId id="258" r:id="rId5"/>
+    <p:sldId id="259" r:id="rId6"/>
   </p:sldIdLst>
   <p:sldSz cx="12192000" cy="6858000"/>
   <p:notesSz cx="6858000" cy="9144000"/>
@@ -261,7 +263,7 @@
           <a:p>
             <a:fld id="{492BE7D4-8037-4E12-A2D9-2553F853E8F1}" type="datetimeFigureOut">
               <a:rPr lang="en-US" smtClean="0"/>
-              <a:t>3/21/2022</a:t>
+              <a:t>4/6/2022</a:t>
             </a:fld>
             <a:endParaRPr lang="en-US"/>
           </a:p>
@@ -459,7 +461,7 @@
           <a:p>
             <a:fld id="{492BE7D4-8037-4E12-A2D9-2553F853E8F1}" type="datetimeFigureOut">
               <a:rPr lang="en-US" smtClean="0"/>
-              <a:t>3/21/2022</a:t>
+              <a:t>4/6/2022</a:t>
             </a:fld>
             <a:endParaRPr lang="en-US"/>
           </a:p>
@@ -667,7 +669,7 @@
           <a:p>
             <a:fld id="{492BE7D4-8037-4E12-A2D9-2553F853E8F1}" type="datetimeFigureOut">
               <a:rPr lang="en-US" smtClean="0"/>
-              <a:t>3/21/2022</a:t>
+              <a:t>4/6/2022</a:t>
             </a:fld>
             <a:endParaRPr lang="en-US"/>
           </a:p>
@@ -865,7 +867,7 @@
           <a:p>
             <a:fld id="{492BE7D4-8037-4E12-A2D9-2553F853E8F1}" type="datetimeFigureOut">
               <a:rPr lang="en-US" smtClean="0"/>
-              <a:t>3/21/2022</a:t>
+              <a:t>4/6/2022</a:t>
             </a:fld>
             <a:endParaRPr lang="en-US"/>
           </a:p>
@@ -1140,7 +1142,7 @@
           <a:p>
             <a:fld id="{492BE7D4-8037-4E12-A2D9-2553F853E8F1}" type="datetimeFigureOut">
               <a:rPr lang="en-US" smtClean="0"/>
-              <a:t>3/21/2022</a:t>
+              <a:t>4/6/2022</a:t>
             </a:fld>
             <a:endParaRPr lang="en-US"/>
           </a:p>
@@ -1405,7 +1407,7 @@
           <a:p>
             <a:fld id="{492BE7D4-8037-4E12-A2D9-2553F853E8F1}" type="datetimeFigureOut">
               <a:rPr lang="en-US" smtClean="0"/>
-              <a:t>3/21/2022</a:t>
+              <a:t>4/6/2022</a:t>
             </a:fld>
             <a:endParaRPr lang="en-US"/>
           </a:p>
@@ -1817,7 +1819,7 @@
           <a:p>
             <a:fld id="{492BE7D4-8037-4E12-A2D9-2553F853E8F1}" type="datetimeFigureOut">
               <a:rPr lang="en-US" smtClean="0"/>
-              <a:t>3/21/2022</a:t>
+              <a:t>4/6/2022</a:t>
             </a:fld>
             <a:endParaRPr lang="en-US"/>
           </a:p>
@@ -1958,7 +1960,7 @@
           <a:p>
             <a:fld id="{492BE7D4-8037-4E12-A2D9-2553F853E8F1}" type="datetimeFigureOut">
               <a:rPr lang="en-US" smtClean="0"/>
-              <a:t>3/21/2022</a:t>
+              <a:t>4/6/2022</a:t>
             </a:fld>
             <a:endParaRPr lang="en-US"/>
           </a:p>
@@ -2071,7 +2073,7 @@
           <a:p>
             <a:fld id="{492BE7D4-8037-4E12-A2D9-2553F853E8F1}" type="datetimeFigureOut">
               <a:rPr lang="en-US" smtClean="0"/>
-              <a:t>3/21/2022</a:t>
+              <a:t>4/6/2022</a:t>
             </a:fld>
             <a:endParaRPr lang="en-US"/>
           </a:p>
@@ -2382,7 +2384,7 @@
           <a:p>
             <a:fld id="{492BE7D4-8037-4E12-A2D9-2553F853E8F1}" type="datetimeFigureOut">
               <a:rPr lang="en-US" smtClean="0"/>
-              <a:t>3/21/2022</a:t>
+              <a:t>4/6/2022</a:t>
             </a:fld>
             <a:endParaRPr lang="en-US"/>
           </a:p>
@@ -2670,7 +2672,7 @@
           <a:p>
             <a:fld id="{492BE7D4-8037-4E12-A2D9-2553F853E8F1}" type="datetimeFigureOut">
               <a:rPr lang="en-US" smtClean="0"/>
-              <a:t>3/21/2022</a:t>
+              <a:t>4/6/2022</a:t>
             </a:fld>
             <a:endParaRPr lang="en-US"/>
           </a:p>
@@ -2911,7 +2913,7 @@
           <a:p>
             <a:fld id="{492BE7D4-8037-4E12-A2D9-2553F853E8F1}" type="datetimeFigureOut">
               <a:rPr lang="en-US" smtClean="0"/>
-              <a:t>3/21/2022</a:t>
+              <a:t>4/6/2022</a:t>
             </a:fld>
             <a:endParaRPr lang="en-US"/>
           </a:p>
@@ -3330,10 +3332,10 @@
       </p:grpSpPr>
       <p:pic>
         <p:nvPicPr>
-          <p:cNvPr id="13" name="Picture 12" descr="Chart, histogram&#10;&#10;Description automatically generated">
-            <a:extLst>
-              <a:ext uri="{FF2B5EF4-FFF2-40B4-BE49-F238E27FC236}">
-                <a16:creationId xmlns:a16="http://schemas.microsoft.com/office/drawing/2014/main" id="{DC86CE6E-5325-407A-BF53-7463A32CA12A}"/>
+          <p:cNvPr id="5" name="Picture 4" descr="Diagram&#10;&#10;Description automatically generated">
+            <a:extLst>
+              <a:ext uri="{FF2B5EF4-FFF2-40B4-BE49-F238E27FC236}">
+                <a16:creationId xmlns:a16="http://schemas.microsoft.com/office/drawing/2014/main" id="{BE544CD4-B0BB-4AF1-A723-EFACE6111C73}"/>
               </a:ext>
             </a:extLst>
           </p:cNvPr>
@@ -3342,7 +3344,7 @@
           </p:cNvPicPr>
           <p:nvPr/>
         </p:nvPicPr>
-        <p:blipFill>
+        <p:blipFill rotWithShape="1">
           <a:blip r:embed="rId2">
             <a:extLst>
               <a:ext uri="{28A0092B-C50C-407E-A947-70E740481C1C}">
@@ -3350,14 +3352,13 @@
               </a:ext>
             </a:extLst>
           </a:blip>
-          <a:stretch>
-            <a:fillRect/>
-          </a:stretch>
+          <a:srcRect b="6729"/>
+          <a:stretch/>
         </p:blipFill>
         <p:spPr>
           <a:xfrm>
-            <a:off x="1988288" y="3204951"/>
-            <a:ext cx="8088773" cy="3576237"/>
+            <a:off x="1103331" y="1583684"/>
+            <a:ext cx="4313145" cy="2822062"/>
           </a:xfrm>
           <a:prstGeom prst="rect">
             <a:avLst/>
@@ -3366,10 +3367,10 @@
       </p:pic>
       <p:pic>
         <p:nvPicPr>
-          <p:cNvPr id="6" name="Picture 5" descr="Chart, line chart&#10;&#10;Description automatically generated">
-            <a:extLst>
-              <a:ext uri="{FF2B5EF4-FFF2-40B4-BE49-F238E27FC236}">
-                <a16:creationId xmlns:a16="http://schemas.microsoft.com/office/drawing/2014/main" id="{379FC4E6-295E-4832-AB10-A9B7947C71EF}"/>
+          <p:cNvPr id="7" name="Picture 6" descr="Diagram&#10;&#10;Description automatically generated">
+            <a:extLst>
+              <a:ext uri="{FF2B5EF4-FFF2-40B4-BE49-F238E27FC236}">
+                <a16:creationId xmlns:a16="http://schemas.microsoft.com/office/drawing/2014/main" id="{A450233E-51AC-430A-A62C-540A08FDE759}"/>
               </a:ext>
             </a:extLst>
           </p:cNvPr>
@@ -3378,7 +3379,7 @@
           </p:cNvPicPr>
           <p:nvPr/>
         </p:nvPicPr>
-        <p:blipFill>
+        <p:blipFill rotWithShape="1">
           <a:blip r:embed="rId3">
             <a:extLst>
               <a:ext uri="{28A0092B-C50C-407E-A947-70E740481C1C}">
@@ -3386,14 +3387,13 @@
               </a:ext>
             </a:extLst>
           </a:blip>
-          <a:stretch>
-            <a:fillRect/>
-          </a:stretch>
+          <a:srcRect t="4993" b="8233"/>
+          <a:stretch/>
         </p:blipFill>
         <p:spPr>
           <a:xfrm>
-            <a:off x="1950095" y="76812"/>
-            <a:ext cx="8123114" cy="3275988"/>
+            <a:off x="5915579" y="1545516"/>
+            <a:ext cx="4560596" cy="2968022"/>
           </a:xfrm>
           <a:prstGeom prst="rect">
             <a:avLst/>
@@ -3402,10 +3402,114 @@
       </p:pic>
       <p:sp>
         <p:nvSpPr>
-          <p:cNvPr id="2" name="TextBox 1">
-            <a:extLst>
-              <a:ext uri="{FF2B5EF4-FFF2-40B4-BE49-F238E27FC236}">
-                <a16:creationId xmlns:a16="http://schemas.microsoft.com/office/drawing/2014/main" id="{128AEF00-45F3-435E-B0E2-00DA664D9569}"/>
+          <p:cNvPr id="8" name="Rectangle 7">
+            <a:extLst>
+              <a:ext uri="{FF2B5EF4-FFF2-40B4-BE49-F238E27FC236}">
+                <a16:creationId xmlns:a16="http://schemas.microsoft.com/office/drawing/2014/main" id="{404FC524-4633-4614-9875-376E0E94DBC1}"/>
+              </a:ext>
+            </a:extLst>
+          </p:cNvPr>
+          <p:cNvSpPr/>
+          <p:nvPr/>
+        </p:nvSpPr>
+        <p:spPr>
+          <a:xfrm>
+            <a:off x="604228" y="1076036"/>
+            <a:ext cx="5026184" cy="3906982"/>
+          </a:xfrm>
+          <a:prstGeom prst="rect">
+            <a:avLst/>
+          </a:prstGeom>
+          <a:noFill/>
+          <a:ln w="28575">
+            <a:solidFill>
+              <a:schemeClr val="tx1"/>
+            </a:solidFill>
+          </a:ln>
+        </p:spPr>
+        <p:style>
+          <a:lnRef idx="2">
+            <a:schemeClr val="accent1">
+              <a:shade val="50000"/>
+            </a:schemeClr>
+          </a:lnRef>
+          <a:fillRef idx="1">
+            <a:schemeClr val="accent1"/>
+          </a:fillRef>
+          <a:effectRef idx="0">
+            <a:schemeClr val="accent1"/>
+          </a:effectRef>
+          <a:fontRef idx="minor">
+            <a:schemeClr val="lt1"/>
+          </a:fontRef>
+        </p:style>
+        <p:txBody>
+          <a:bodyPr rtlCol="0" anchor="ctr"/>
+          <a:lstStyle/>
+          <a:p>
+            <a:pPr algn="ctr"/>
+            <a:endParaRPr lang="en-US"/>
+          </a:p>
+        </p:txBody>
+      </p:sp>
+      <p:sp>
+        <p:nvSpPr>
+          <p:cNvPr id="10" name="Rectangle 9">
+            <a:extLst>
+              <a:ext uri="{FF2B5EF4-FFF2-40B4-BE49-F238E27FC236}">
+                <a16:creationId xmlns:a16="http://schemas.microsoft.com/office/drawing/2014/main" id="{F68DCCA0-16E6-450A-B854-3D2210FB33B6}"/>
+              </a:ext>
+            </a:extLst>
+          </p:cNvPr>
+          <p:cNvSpPr/>
+          <p:nvPr/>
+        </p:nvSpPr>
+        <p:spPr>
+          <a:xfrm>
+            <a:off x="5630412" y="1076036"/>
+            <a:ext cx="5026184" cy="3906982"/>
+          </a:xfrm>
+          <a:prstGeom prst="rect">
+            <a:avLst/>
+          </a:prstGeom>
+          <a:noFill/>
+          <a:ln w="28575">
+            <a:solidFill>
+              <a:schemeClr val="tx1"/>
+            </a:solidFill>
+          </a:ln>
+        </p:spPr>
+        <p:style>
+          <a:lnRef idx="2">
+            <a:schemeClr val="accent1">
+              <a:shade val="50000"/>
+            </a:schemeClr>
+          </a:lnRef>
+          <a:fillRef idx="1">
+            <a:schemeClr val="accent1"/>
+          </a:fillRef>
+          <a:effectRef idx="0">
+            <a:schemeClr val="accent1"/>
+          </a:effectRef>
+          <a:fontRef idx="minor">
+            <a:schemeClr val="lt1"/>
+          </a:fontRef>
+        </p:style>
+        <p:txBody>
+          <a:bodyPr rtlCol="0" anchor="ctr"/>
+          <a:lstStyle/>
+          <a:p>
+            <a:pPr algn="ctr"/>
+            <a:endParaRPr lang="en-US"/>
+          </a:p>
+        </p:txBody>
+      </p:sp>
+      <p:sp>
+        <p:nvSpPr>
+          <p:cNvPr id="11" name="TextBox 10">
+            <a:extLst>
+              <a:ext uri="{FF2B5EF4-FFF2-40B4-BE49-F238E27FC236}">
+                <a16:creationId xmlns:a16="http://schemas.microsoft.com/office/drawing/2014/main" id="{E9A4D907-5375-4AA5-9640-C158731143F0}"/>
               </a:ext>
             </a:extLst>
           </p:cNvPr>
@@ -3414,8 +3518,8 @@
         </p:nvSpPr>
         <p:spPr>
           <a:xfrm>
-            <a:off x="2506717" y="274062"/>
-            <a:ext cx="3810956" cy="276999"/>
+            <a:off x="604228" y="1076036"/>
+            <a:ext cx="3810956" cy="400110"/>
           </a:xfrm>
           <a:prstGeom prst="rect">
             <a:avLst/>
@@ -3429,7 +3533,7 @@
           <a:lstStyle/>
           <a:p>
             <a:r>
-              <a:rPr lang="en-US" sz="1200" b="1" dirty="0">
+              <a:rPr lang="en-US" sz="2000" b="1" dirty="0">
                 <a:solidFill>
                   <a:schemeClr val="tx1">
                     <a:lumMod val="85000"/>
@@ -3438,17 +3542,17 @@
                 </a:solidFill>
                 <a:latin typeface="DejaVu Sans"/>
               </a:rPr>
-              <a:t>(a) SSD1 and SSD4 Electron Flux vs Time</a:t>
-            </a:r>
-          </a:p>
-        </p:txBody>
-      </p:sp>
-      <p:sp>
-        <p:nvSpPr>
-          <p:cNvPr id="7" name="TextBox 6">
-            <a:extLst>
-              <a:ext uri="{FF2B5EF4-FFF2-40B4-BE49-F238E27FC236}">
-                <a16:creationId xmlns:a16="http://schemas.microsoft.com/office/drawing/2014/main" id="{8F5B05AC-3A67-40A3-B0C9-CB6B218146FF}"/>
+              <a:t>(a)</a:t>
+            </a:r>
+          </a:p>
+        </p:txBody>
+      </p:sp>
+      <p:sp>
+        <p:nvSpPr>
+          <p:cNvPr id="12" name="TextBox 11">
+            <a:extLst>
+              <a:ext uri="{FF2B5EF4-FFF2-40B4-BE49-F238E27FC236}">
+                <a16:creationId xmlns:a16="http://schemas.microsoft.com/office/drawing/2014/main" id="{F2BD3FE4-D1AF-4B3F-8286-A0DB7D577D80}"/>
               </a:ext>
             </a:extLst>
           </p:cNvPr>
@@ -3457,8 +3561,8 @@
         </p:nvSpPr>
         <p:spPr>
           <a:xfrm>
-            <a:off x="2506717" y="3238936"/>
-            <a:ext cx="3404556" cy="276999"/>
+            <a:off x="5630412" y="1076036"/>
+            <a:ext cx="3810956" cy="400110"/>
           </a:xfrm>
           <a:prstGeom prst="rect">
             <a:avLst/>
@@ -3472,7 +3576,7 @@
           <a:lstStyle/>
           <a:p>
             <a:r>
-              <a:rPr lang="en-US" sz="1200" b="1" dirty="0">
+              <a:rPr lang="en-US" sz="2000" b="1" dirty="0">
                 <a:solidFill>
                   <a:schemeClr val="tx1">
                     <a:lumMod val="85000"/>
@@ -3481,15 +3585,280 @@
                 </a:solidFill>
                 <a:latin typeface="DejaVu Sans"/>
               </a:rPr>
-              <a:t>(b) Isotropy Index vs Time</a:t>
-            </a:r>
-          </a:p>
-        </p:txBody>
-      </p:sp>
+              <a:t>(b)</a:t>
+            </a:r>
+          </a:p>
+        </p:txBody>
+      </p:sp>
+      <p:sp>
+        <p:nvSpPr>
+          <p:cNvPr id="13" name="TextBox 12">
+            <a:extLst>
+              <a:ext uri="{FF2B5EF4-FFF2-40B4-BE49-F238E27FC236}">
+                <a16:creationId xmlns:a16="http://schemas.microsoft.com/office/drawing/2014/main" id="{470ACFD0-6360-4E52-BFDC-106D2E64CC91}"/>
+              </a:ext>
+            </a:extLst>
+          </p:cNvPr>
+          <p:cNvSpPr txBox="1"/>
+          <p:nvPr/>
+        </p:nvSpPr>
+        <p:spPr>
+          <a:xfrm>
+            <a:off x="744046" y="4414983"/>
+            <a:ext cx="4932972" cy="307777"/>
+          </a:xfrm>
+          <a:prstGeom prst="rect">
+            <a:avLst/>
+          </a:prstGeom>
+          <a:noFill/>
+        </p:spPr>
+        <p:txBody>
+          <a:bodyPr wrap="square" rtlCol="0">
+            <a:spAutoFit/>
+          </a:bodyPr>
+          <a:lstStyle/>
+          <a:p>
+            <a:r>
+              <a:rPr lang="en-US" sz="1400" dirty="0">
+                <a:solidFill>
+                  <a:schemeClr val="tx1">
+                    <a:lumMod val="85000"/>
+                    <a:lumOff val="15000"/>
+                  </a:schemeClr>
+                </a:solidFill>
+                <a:latin typeface="DejaVu Sans"/>
+              </a:rPr>
+              <a:t>Gyro Motion      Bounce Motion      Drift Motion</a:t>
+            </a:r>
+          </a:p>
+        </p:txBody>
+      </p:sp>
+      <mc:AlternateContent xmlns:mc="http://schemas.openxmlformats.org/markup-compatibility/2006">
+        <mc:Choice xmlns:a14="http://schemas.microsoft.com/office/drawing/2010/main" Requires="a14">
+          <p:sp>
+            <p:nvSpPr>
+              <p:cNvPr id="9" name="TextBox 8">
+                <a:extLst>
+                  <a:ext uri="{FF2B5EF4-FFF2-40B4-BE49-F238E27FC236}">
+                    <a16:creationId xmlns:a16="http://schemas.microsoft.com/office/drawing/2014/main" id="{B1FE9BEF-9011-4194-A5E3-D4FCC794765D}"/>
+                  </a:ext>
+                </a:extLst>
+              </p:cNvPr>
+              <p:cNvSpPr txBox="1"/>
+              <p:nvPr/>
+            </p:nvSpPr>
+            <p:spPr>
+              <a:xfrm>
+                <a:off x="5723624" y="4365321"/>
+                <a:ext cx="4932972" cy="407099"/>
+              </a:xfrm>
+              <a:prstGeom prst="rect">
+                <a:avLst/>
+              </a:prstGeom>
+              <a:noFill/>
+            </p:spPr>
+            <p:txBody>
+              <a:bodyPr wrap="square" rtlCol="0">
+                <a:spAutoFit/>
+              </a:bodyPr>
+              <a:lstStyle/>
+              <a:p>
+                <a14:m>
+                  <m:oMathPara xmlns:m="http://schemas.openxmlformats.org/officeDocument/2006/math">
+                    <m:oMathParaPr>
+                      <m:jc m:val="centerGroup"/>
+                    </m:oMathParaPr>
+                    <m:oMath xmlns:m="http://schemas.openxmlformats.org/officeDocument/2006/math">
+                      <m:r>
+                        <a:rPr lang="en-US" sz="2000" b="1" i="1" smtClean="0">
+                          <a:solidFill>
+                            <a:schemeClr val="tx1">
+                              <a:lumMod val="85000"/>
+                              <a:lumOff val="15000"/>
+                            </a:schemeClr>
+                          </a:solidFill>
+                          <a:latin typeface="Cambria Math" panose="02040503050406030204" pitchFamily="18" charset="0"/>
+                        </a:rPr>
+                        <m:t>𝑭</m:t>
+                      </m:r>
+                      <m:r>
+                        <a:rPr lang="en-US" sz="2000" i="1" smtClean="0">
+                          <a:solidFill>
+                            <a:schemeClr val="tx1">
+                              <a:lumMod val="85000"/>
+                              <a:lumOff val="15000"/>
+                            </a:schemeClr>
+                          </a:solidFill>
+                          <a:latin typeface="DejaVu Sans"/>
+                        </a:rPr>
+                        <m:t>=</m:t>
+                      </m:r>
+                      <m:r>
+                        <a:rPr lang="en-US" sz="2000" b="0" i="1" smtClean="0">
+                          <a:solidFill>
+                            <a:schemeClr val="tx1">
+                              <a:lumMod val="85000"/>
+                              <a:lumOff val="15000"/>
+                            </a:schemeClr>
+                          </a:solidFill>
+                          <a:latin typeface="Cambria Math" panose="02040503050406030204" pitchFamily="18" charset="0"/>
+                        </a:rPr>
+                        <m:t>𝑞</m:t>
+                      </m:r>
+                      <m:r>
+                        <a:rPr lang="en-US" sz="2000" b="0" i="1" smtClean="0">
+                          <a:solidFill>
+                            <a:schemeClr val="tx1">
+                              <a:lumMod val="85000"/>
+                              <a:lumOff val="15000"/>
+                            </a:schemeClr>
+                          </a:solidFill>
+                          <a:latin typeface="Cambria Math" panose="02040503050406030204" pitchFamily="18" charset="0"/>
+                        </a:rPr>
+                        <m:t>(</m:t>
+                      </m:r>
+                      <m:r>
+                        <a:rPr lang="en-US" sz="2000" b="1" i="1" smtClean="0">
+                          <a:solidFill>
+                            <a:schemeClr val="tx1">
+                              <a:lumMod val="85000"/>
+                              <a:lumOff val="15000"/>
+                            </a:schemeClr>
+                          </a:solidFill>
+                          <a:latin typeface="Cambria Math" panose="02040503050406030204" pitchFamily="18" charset="0"/>
+                        </a:rPr>
+                        <m:t>𝒗</m:t>
+                      </m:r>
+                      <m:r>
+                        <a:rPr lang="en-US" sz="2000" b="1" i="1" smtClean="0">
+                          <a:solidFill>
+                            <a:schemeClr val="tx1">
+                              <a:lumMod val="85000"/>
+                              <a:lumOff val="15000"/>
+                            </a:schemeClr>
+                          </a:solidFill>
+                          <a:latin typeface="Cambria Math" panose="02040503050406030204" pitchFamily="18" charset="0"/>
+                          <a:ea typeface="Cambria Math" panose="02040503050406030204" pitchFamily="18" charset="0"/>
+                        </a:rPr>
+                        <m:t>×</m:t>
+                      </m:r>
+                      <m:r>
+                        <a:rPr lang="en-US" sz="2000" b="1" i="1" smtClean="0">
+                          <a:solidFill>
+                            <a:schemeClr val="tx1">
+                              <a:lumMod val="85000"/>
+                              <a:lumOff val="15000"/>
+                            </a:schemeClr>
+                          </a:solidFill>
+                          <a:latin typeface="Cambria Math" panose="02040503050406030204" pitchFamily="18" charset="0"/>
+                          <a:ea typeface="Cambria Math" panose="02040503050406030204" pitchFamily="18" charset="0"/>
+                        </a:rPr>
+                        <m:t>𝑩</m:t>
+                      </m:r>
+                      <m:r>
+                        <a:rPr lang="en-US" sz="2000" b="0" i="1" smtClean="0">
+                          <a:solidFill>
+                            <a:schemeClr val="tx1">
+                              <a:lumMod val="85000"/>
+                              <a:lumOff val="15000"/>
+                            </a:schemeClr>
+                          </a:solidFill>
+                          <a:latin typeface="Cambria Math" panose="02040503050406030204" pitchFamily="18" charset="0"/>
+                          <a:ea typeface="Cambria Math" panose="02040503050406030204" pitchFamily="18" charset="0"/>
+                        </a:rPr>
+                        <m:t>+</m:t>
+                      </m:r>
+                      <m:r>
+                        <a:rPr lang="en-US" sz="2000" b="1" i="1" smtClean="0">
+                          <a:solidFill>
+                            <a:schemeClr val="tx1">
+                              <a:lumMod val="85000"/>
+                              <a:lumOff val="15000"/>
+                            </a:schemeClr>
+                          </a:solidFill>
+                          <a:latin typeface="Cambria Math" panose="02040503050406030204" pitchFamily="18" charset="0"/>
+                          <a:ea typeface="Cambria Math" panose="02040503050406030204" pitchFamily="18" charset="0"/>
+                        </a:rPr>
+                        <m:t>𝑬</m:t>
+                      </m:r>
+                      <m:r>
+                        <a:rPr lang="en-US" sz="2000" b="0" i="1" smtClean="0">
+                          <a:solidFill>
+                            <a:schemeClr val="tx1">
+                              <a:lumMod val="85000"/>
+                              <a:lumOff val="15000"/>
+                            </a:schemeClr>
+                          </a:solidFill>
+                          <a:latin typeface="Cambria Math" panose="02040503050406030204" pitchFamily="18" charset="0"/>
+                          <a:ea typeface="Cambria Math" panose="02040503050406030204" pitchFamily="18" charset="0"/>
+                        </a:rPr>
+                        <m:t>)</m:t>
+                      </m:r>
+                    </m:oMath>
+                  </m:oMathPara>
+                </a14:m>
+                <a:endParaRPr lang="en-US" sz="2000" dirty="0">
+                  <a:solidFill>
+                    <a:schemeClr val="tx1">
+                      <a:lumMod val="85000"/>
+                      <a:lumOff val="15000"/>
+                    </a:schemeClr>
+                  </a:solidFill>
+                  <a:latin typeface="DejaVu Sans"/>
+                </a:endParaRPr>
+              </a:p>
+            </p:txBody>
+          </p:sp>
+        </mc:Choice>
+        <mc:Fallback>
+          <p:sp>
+            <p:nvSpPr>
+              <p:cNvPr id="9" name="TextBox 8">
+                <a:extLst>
+                  <a:ext uri="{FF2B5EF4-FFF2-40B4-BE49-F238E27FC236}">
+                    <a16:creationId xmlns:a16="http://schemas.microsoft.com/office/drawing/2014/main" id="{B1FE9BEF-9011-4194-A5E3-D4FCC794765D}"/>
+                  </a:ext>
+                </a:extLst>
+              </p:cNvPr>
+              <p:cNvSpPr txBox="1">
+                <a:spLocks noRot="1" noChangeAspect="1" noMove="1" noResize="1" noEditPoints="1" noAdjustHandles="1" noChangeArrowheads="1" noChangeShapeType="1" noTextEdit="1"/>
+              </p:cNvSpPr>
+              <p:nvPr/>
+            </p:nvSpPr>
+            <p:spPr>
+              <a:xfrm>
+                <a:off x="5723624" y="4365321"/>
+                <a:ext cx="4932972" cy="407099"/>
+              </a:xfrm>
+              <a:prstGeom prst="rect">
+                <a:avLst/>
+              </a:prstGeom>
+              <a:blipFill>
+                <a:blip r:embed="rId4"/>
+                <a:stretch>
+                  <a:fillRect b="-16418"/>
+                </a:stretch>
+              </a:blipFill>
+            </p:spPr>
+            <p:txBody>
+              <a:bodyPr/>
+              <a:lstStyle/>
+              <a:p>
+                <a:r>
+                  <a:rPr lang="en-US">
+                    <a:noFill/>
+                  </a:rPr>
+                  <a:t> </a:t>
+                </a:r>
+              </a:p>
+            </p:txBody>
+          </p:sp>
+        </mc:Fallback>
+      </mc:AlternateContent>
     </p:spTree>
     <p:extLst>
       <p:ext uri="{BB962C8B-B14F-4D97-AF65-F5344CB8AC3E}">
-        <p14:creationId xmlns:p14="http://schemas.microsoft.com/office/powerpoint/2010/main" val="1659225477"/>
+        <p14:creationId xmlns:p14="http://schemas.microsoft.com/office/powerpoint/2010/main" val="2083321096"/>
       </p:ext>
     </p:extLst>
   </p:cSld>
@@ -3518,6 +3887,260 @@
       </p:grpSpPr>
       <p:pic>
         <p:nvPicPr>
+          <p:cNvPr id="5" name="Picture 4" descr="Diagram&#10;&#10;Description automatically generated">
+            <a:extLst>
+              <a:ext uri="{FF2B5EF4-FFF2-40B4-BE49-F238E27FC236}">
+                <a16:creationId xmlns:a16="http://schemas.microsoft.com/office/drawing/2014/main" id="{E2C04A92-93E5-49EF-B33B-628C1179A28E}"/>
+              </a:ext>
+            </a:extLst>
+          </p:cNvPr>
+          <p:cNvPicPr>
+            <a:picLocks noChangeAspect="1"/>
+          </p:cNvPicPr>
+          <p:nvPr/>
+        </p:nvPicPr>
+        <p:blipFill>
+          <a:blip r:embed="rId2">
+            <a:extLst>
+              <a:ext uri="{28A0092B-C50C-407E-A947-70E740481C1C}">
+                <a14:useLocalDpi xmlns:a14="http://schemas.microsoft.com/office/drawing/2010/main" val="0"/>
+              </a:ext>
+            </a:extLst>
+          </a:blip>
+          <a:stretch>
+            <a:fillRect/>
+          </a:stretch>
+        </p:blipFill>
+        <p:spPr>
+          <a:xfrm>
+            <a:off x="821112" y="517106"/>
+            <a:ext cx="10549776" cy="5823788"/>
+          </a:xfrm>
+          <a:prstGeom prst="rect">
+            <a:avLst/>
+          </a:prstGeom>
+        </p:spPr>
+      </p:pic>
+    </p:spTree>
+    <p:extLst>
+      <p:ext uri="{BB962C8B-B14F-4D97-AF65-F5344CB8AC3E}">
+        <p14:creationId xmlns:p14="http://schemas.microsoft.com/office/powerpoint/2010/main" val="858439912"/>
+      </p:ext>
+    </p:extLst>
+  </p:cSld>
+  <p:clrMapOvr>
+    <a:masterClrMapping/>
+  </p:clrMapOvr>
+</p:sld>
+</file>
+
+<file path=ppt/slides/slide3.xml><?xml version="1.0" encoding="utf-8"?>
+<p:sld xmlns:a="http://schemas.openxmlformats.org/drawingml/2006/main" xmlns:r="http://schemas.openxmlformats.org/officeDocument/2006/relationships" xmlns:p="http://schemas.openxmlformats.org/presentationml/2006/main">
+  <p:cSld>
+    <p:spTree>
+      <p:nvGrpSpPr>
+        <p:cNvPr id="1" name=""/>
+        <p:cNvGrpSpPr/>
+        <p:nvPr/>
+      </p:nvGrpSpPr>
+      <p:grpSpPr>
+        <a:xfrm>
+          <a:off x="0" y="0"/>
+          <a:ext cx="0" cy="0"/>
+          <a:chOff x="0" y="0"/>
+          <a:chExt cx="0" cy="0"/>
+        </a:xfrm>
+      </p:grpSpPr>
+      <p:pic>
+        <p:nvPicPr>
+          <p:cNvPr id="13" name="Picture 12" descr="Chart, histogram&#10;&#10;Description automatically generated">
+            <a:extLst>
+              <a:ext uri="{FF2B5EF4-FFF2-40B4-BE49-F238E27FC236}">
+                <a16:creationId xmlns:a16="http://schemas.microsoft.com/office/drawing/2014/main" id="{DC86CE6E-5325-407A-BF53-7463A32CA12A}"/>
+              </a:ext>
+            </a:extLst>
+          </p:cNvPr>
+          <p:cNvPicPr>
+            <a:picLocks noChangeAspect="1"/>
+          </p:cNvPicPr>
+          <p:nvPr/>
+        </p:nvPicPr>
+        <p:blipFill>
+          <a:blip r:embed="rId2">
+            <a:extLst>
+              <a:ext uri="{28A0092B-C50C-407E-A947-70E740481C1C}">
+                <a14:useLocalDpi xmlns:a14="http://schemas.microsoft.com/office/drawing/2010/main" val="0"/>
+              </a:ext>
+            </a:extLst>
+          </a:blip>
+          <a:stretch>
+            <a:fillRect/>
+          </a:stretch>
+        </p:blipFill>
+        <p:spPr>
+          <a:xfrm>
+            <a:off x="1988288" y="3204951"/>
+            <a:ext cx="8088773" cy="3576237"/>
+          </a:xfrm>
+          <a:prstGeom prst="rect">
+            <a:avLst/>
+          </a:prstGeom>
+        </p:spPr>
+      </p:pic>
+      <p:pic>
+        <p:nvPicPr>
+          <p:cNvPr id="6" name="Picture 5" descr="Chart, line chart&#10;&#10;Description automatically generated">
+            <a:extLst>
+              <a:ext uri="{FF2B5EF4-FFF2-40B4-BE49-F238E27FC236}">
+                <a16:creationId xmlns:a16="http://schemas.microsoft.com/office/drawing/2014/main" id="{379FC4E6-295E-4832-AB10-A9B7947C71EF}"/>
+              </a:ext>
+            </a:extLst>
+          </p:cNvPr>
+          <p:cNvPicPr>
+            <a:picLocks noChangeAspect="1"/>
+          </p:cNvPicPr>
+          <p:nvPr/>
+        </p:nvPicPr>
+        <p:blipFill>
+          <a:blip r:embed="rId3">
+            <a:extLst>
+              <a:ext uri="{28A0092B-C50C-407E-A947-70E740481C1C}">
+                <a14:useLocalDpi xmlns:a14="http://schemas.microsoft.com/office/drawing/2010/main" val="0"/>
+              </a:ext>
+            </a:extLst>
+          </a:blip>
+          <a:stretch>
+            <a:fillRect/>
+          </a:stretch>
+        </p:blipFill>
+        <p:spPr>
+          <a:xfrm>
+            <a:off x="1950095" y="76812"/>
+            <a:ext cx="8123114" cy="3275988"/>
+          </a:xfrm>
+          <a:prstGeom prst="rect">
+            <a:avLst/>
+          </a:prstGeom>
+        </p:spPr>
+      </p:pic>
+      <p:sp>
+        <p:nvSpPr>
+          <p:cNvPr id="2" name="TextBox 1">
+            <a:extLst>
+              <a:ext uri="{FF2B5EF4-FFF2-40B4-BE49-F238E27FC236}">
+                <a16:creationId xmlns:a16="http://schemas.microsoft.com/office/drawing/2014/main" id="{128AEF00-45F3-435E-B0E2-00DA664D9569}"/>
+              </a:ext>
+            </a:extLst>
+          </p:cNvPr>
+          <p:cNvSpPr txBox="1"/>
+          <p:nvPr/>
+        </p:nvSpPr>
+        <p:spPr>
+          <a:xfrm>
+            <a:off x="2506717" y="274062"/>
+            <a:ext cx="3810956" cy="276999"/>
+          </a:xfrm>
+          <a:prstGeom prst="rect">
+            <a:avLst/>
+          </a:prstGeom>
+          <a:noFill/>
+        </p:spPr>
+        <p:txBody>
+          <a:bodyPr wrap="square" rtlCol="0">
+            <a:spAutoFit/>
+          </a:bodyPr>
+          <a:lstStyle/>
+          <a:p>
+            <a:r>
+              <a:rPr lang="en-US" sz="1200" b="1" dirty="0">
+                <a:solidFill>
+                  <a:schemeClr val="tx1">
+                    <a:lumMod val="85000"/>
+                    <a:lumOff val="15000"/>
+                  </a:schemeClr>
+                </a:solidFill>
+                <a:latin typeface="DejaVu Sans"/>
+              </a:rPr>
+              <a:t>(a) SSD1 and SSD4 Electron Flux vs Time</a:t>
+            </a:r>
+          </a:p>
+        </p:txBody>
+      </p:sp>
+      <p:sp>
+        <p:nvSpPr>
+          <p:cNvPr id="7" name="TextBox 6">
+            <a:extLst>
+              <a:ext uri="{FF2B5EF4-FFF2-40B4-BE49-F238E27FC236}">
+                <a16:creationId xmlns:a16="http://schemas.microsoft.com/office/drawing/2014/main" id="{8F5B05AC-3A67-40A3-B0C9-CB6B218146FF}"/>
+              </a:ext>
+            </a:extLst>
+          </p:cNvPr>
+          <p:cNvSpPr txBox="1"/>
+          <p:nvPr/>
+        </p:nvSpPr>
+        <p:spPr>
+          <a:xfrm>
+            <a:off x="2506717" y="3238936"/>
+            <a:ext cx="3404556" cy="276999"/>
+          </a:xfrm>
+          <a:prstGeom prst="rect">
+            <a:avLst/>
+          </a:prstGeom>
+          <a:noFill/>
+        </p:spPr>
+        <p:txBody>
+          <a:bodyPr wrap="square" rtlCol="0">
+            <a:spAutoFit/>
+          </a:bodyPr>
+          <a:lstStyle/>
+          <a:p>
+            <a:r>
+              <a:rPr lang="en-US" sz="1200" b="1" dirty="0">
+                <a:solidFill>
+                  <a:schemeClr val="tx1">
+                    <a:lumMod val="85000"/>
+                    <a:lumOff val="15000"/>
+                  </a:schemeClr>
+                </a:solidFill>
+                <a:latin typeface="DejaVu Sans"/>
+              </a:rPr>
+              <a:t>(b) Isotropy Index vs Time</a:t>
+            </a:r>
+          </a:p>
+        </p:txBody>
+      </p:sp>
+    </p:spTree>
+    <p:extLst>
+      <p:ext uri="{BB962C8B-B14F-4D97-AF65-F5344CB8AC3E}">
+        <p14:creationId xmlns:p14="http://schemas.microsoft.com/office/powerpoint/2010/main" val="1659225477"/>
+      </p:ext>
+    </p:extLst>
+  </p:cSld>
+  <p:clrMapOvr>
+    <a:masterClrMapping/>
+  </p:clrMapOvr>
+</p:sld>
+</file>
+
+<file path=ppt/slides/slide4.xml><?xml version="1.0" encoding="utf-8"?>
+<p:sld xmlns:a="http://schemas.openxmlformats.org/drawingml/2006/main" xmlns:r="http://schemas.openxmlformats.org/officeDocument/2006/relationships" xmlns:p="http://schemas.openxmlformats.org/presentationml/2006/main">
+  <p:cSld>
+    <p:spTree>
+      <p:nvGrpSpPr>
+        <p:cNvPr id="1" name=""/>
+        <p:cNvGrpSpPr/>
+        <p:nvPr/>
+      </p:nvGrpSpPr>
+      <p:grpSpPr>
+        <a:xfrm>
+          <a:off x="0" y="0"/>
+          <a:ext cx="0" cy="0"/>
+          <a:chOff x="0" y="0"/>
+          <a:chExt cx="0" cy="0"/>
+        </a:xfrm>
+      </p:grpSpPr>
+      <p:pic>
+        <p:nvPicPr>
           <p:cNvPr id="12" name="Picture 11" descr="Chart, box and whisker chart&#10;&#10;Description automatically generated">
             <a:extLst>
               <a:ext uri="{FF2B5EF4-FFF2-40B4-BE49-F238E27FC236}">
@@ -3766,7 +4389,7 @@
 </p:sld>
 </file>
 
-<file path=ppt/slides/slide3.xml><?xml version="1.0" encoding="utf-8"?>
+<file path=ppt/slides/slide5.xml><?xml version="1.0" encoding="utf-8"?>
 <p:sld xmlns:a="http://schemas.openxmlformats.org/drawingml/2006/main" xmlns:r="http://schemas.openxmlformats.org/officeDocument/2006/relationships" xmlns:p="http://schemas.openxmlformats.org/presentationml/2006/main">
   <p:cSld>
     <p:spTree>

</xml_diff>

<commit_message>
Coded graphs for JGR reviewer response
</commit_message>
<xml_diff>
--- a/sampexlib/Saved Plots/Research Paper Plots/Temporary Panel Creator.pptx
+++ b/sampexlib/Saved Plots/Research Paper Plots/Temporary Panel Creator.pptx
@@ -10,6 +10,7 @@
     <p:sldId id="256" r:id="rId4"/>
     <p:sldId id="258" r:id="rId5"/>
     <p:sldId id="259" r:id="rId6"/>
+    <p:sldId id="262" r:id="rId7"/>
   </p:sldIdLst>
   <p:sldSz cx="12192000" cy="6858000"/>
   <p:notesSz cx="6858000" cy="9144000"/>
@@ -263,7 +264,7 @@
           <a:p>
             <a:fld id="{492BE7D4-8037-4E12-A2D9-2553F853E8F1}" type="datetimeFigureOut">
               <a:rPr lang="en-US" smtClean="0"/>
-              <a:t>4/6/2022</a:t>
+              <a:t>7/27/2022</a:t>
             </a:fld>
             <a:endParaRPr lang="en-US"/>
           </a:p>
@@ -461,7 +462,7 @@
           <a:p>
             <a:fld id="{492BE7D4-8037-4E12-A2D9-2553F853E8F1}" type="datetimeFigureOut">
               <a:rPr lang="en-US" smtClean="0"/>
-              <a:t>4/6/2022</a:t>
+              <a:t>7/27/2022</a:t>
             </a:fld>
             <a:endParaRPr lang="en-US"/>
           </a:p>
@@ -669,7 +670,7 @@
           <a:p>
             <a:fld id="{492BE7D4-8037-4E12-A2D9-2553F853E8F1}" type="datetimeFigureOut">
               <a:rPr lang="en-US" smtClean="0"/>
-              <a:t>4/6/2022</a:t>
+              <a:t>7/27/2022</a:t>
             </a:fld>
             <a:endParaRPr lang="en-US"/>
           </a:p>
@@ -867,7 +868,7 @@
           <a:p>
             <a:fld id="{492BE7D4-8037-4E12-A2D9-2553F853E8F1}" type="datetimeFigureOut">
               <a:rPr lang="en-US" smtClean="0"/>
-              <a:t>4/6/2022</a:t>
+              <a:t>7/27/2022</a:t>
             </a:fld>
             <a:endParaRPr lang="en-US"/>
           </a:p>
@@ -1142,7 +1143,7 @@
           <a:p>
             <a:fld id="{492BE7D4-8037-4E12-A2D9-2553F853E8F1}" type="datetimeFigureOut">
               <a:rPr lang="en-US" smtClean="0"/>
-              <a:t>4/6/2022</a:t>
+              <a:t>7/27/2022</a:t>
             </a:fld>
             <a:endParaRPr lang="en-US"/>
           </a:p>
@@ -1407,7 +1408,7 @@
           <a:p>
             <a:fld id="{492BE7D4-8037-4E12-A2D9-2553F853E8F1}" type="datetimeFigureOut">
               <a:rPr lang="en-US" smtClean="0"/>
-              <a:t>4/6/2022</a:t>
+              <a:t>7/27/2022</a:t>
             </a:fld>
             <a:endParaRPr lang="en-US"/>
           </a:p>
@@ -1819,7 +1820,7 @@
           <a:p>
             <a:fld id="{492BE7D4-8037-4E12-A2D9-2553F853E8F1}" type="datetimeFigureOut">
               <a:rPr lang="en-US" smtClean="0"/>
-              <a:t>4/6/2022</a:t>
+              <a:t>7/27/2022</a:t>
             </a:fld>
             <a:endParaRPr lang="en-US"/>
           </a:p>
@@ -1960,7 +1961,7 @@
           <a:p>
             <a:fld id="{492BE7D4-8037-4E12-A2D9-2553F853E8F1}" type="datetimeFigureOut">
               <a:rPr lang="en-US" smtClean="0"/>
-              <a:t>4/6/2022</a:t>
+              <a:t>7/27/2022</a:t>
             </a:fld>
             <a:endParaRPr lang="en-US"/>
           </a:p>
@@ -2073,7 +2074,7 @@
           <a:p>
             <a:fld id="{492BE7D4-8037-4E12-A2D9-2553F853E8F1}" type="datetimeFigureOut">
               <a:rPr lang="en-US" smtClean="0"/>
-              <a:t>4/6/2022</a:t>
+              <a:t>7/27/2022</a:t>
             </a:fld>
             <a:endParaRPr lang="en-US"/>
           </a:p>
@@ -2384,7 +2385,7 @@
           <a:p>
             <a:fld id="{492BE7D4-8037-4E12-A2D9-2553F853E8F1}" type="datetimeFigureOut">
               <a:rPr lang="en-US" smtClean="0"/>
-              <a:t>4/6/2022</a:t>
+              <a:t>7/27/2022</a:t>
             </a:fld>
             <a:endParaRPr lang="en-US"/>
           </a:p>
@@ -2672,7 +2673,7 @@
           <a:p>
             <a:fld id="{492BE7D4-8037-4E12-A2D9-2553F853E8F1}" type="datetimeFigureOut">
               <a:rPr lang="en-US" smtClean="0"/>
-              <a:t>4/6/2022</a:t>
+              <a:t>7/27/2022</a:t>
             </a:fld>
             <a:endParaRPr lang="en-US"/>
           </a:p>
@@ -2913,7 +2914,7 @@
           <a:p>
             <a:fld id="{492BE7D4-8037-4E12-A2D9-2553F853E8F1}" type="datetimeFigureOut">
               <a:rPr lang="en-US" smtClean="0"/>
-              <a:t>4/6/2022</a:t>
+              <a:t>7/27/2022</a:t>
             </a:fld>
             <a:endParaRPr lang="en-US"/>
           </a:p>
@@ -3633,8 +3634,8 @@
           </a:p>
         </p:txBody>
       </p:sp>
-      <mc:AlternateContent xmlns:mc="http://schemas.openxmlformats.org/markup-compatibility/2006">
-        <mc:Choice xmlns:a14="http://schemas.microsoft.com/office/drawing/2010/main" Requires="a14">
+      <mc:AlternateContent xmlns:mc="http://schemas.openxmlformats.org/markup-compatibility/2006" xmlns:a14="http://schemas.microsoft.com/office/drawing/2010/main">
+        <mc:Choice Requires="a14">
           <p:sp>
             <p:nvSpPr>
               <p:cNvPr id="9" name="TextBox 8">
@@ -3663,6 +3664,7 @@
               </a:bodyPr>
               <a:lstStyle/>
               <a:p>
+                <a:pPr/>
                 <a14:m>
                   <m:oMathPara xmlns:m="http://schemas.openxmlformats.org/officeDocument/2006/math">
                     <m:oMathParaPr>
@@ -3689,7 +3691,7 @@
                               <a:lumOff val="15000"/>
                             </a:schemeClr>
                           </a:solidFill>
-                          <a:latin typeface="DejaVu Sans"/>
+                          <a:latin typeface="Cambria Math" panose="02040503050406030204" pitchFamily="18" charset="0"/>
                         </a:rPr>
                         <m:t>=</m:t>
                       </m:r>
@@ -3810,7 +3812,7 @@
             </p:txBody>
           </p:sp>
         </mc:Choice>
-        <mc:Fallback>
+        <mc:Fallback xmlns="">
           <p:sp>
             <p:nvSpPr>
               <p:cNvPr id="9" name="TextBox 8">
@@ -4622,6 +4624,248 @@
     <p:extLst>
       <p:ext uri="{BB962C8B-B14F-4D97-AF65-F5344CB8AC3E}">
         <p14:creationId xmlns:p14="http://schemas.microsoft.com/office/powerpoint/2010/main" val="585219542"/>
+      </p:ext>
+    </p:extLst>
+  </p:cSld>
+  <p:clrMapOvr>
+    <a:masterClrMapping/>
+  </p:clrMapOvr>
+</p:sld>
+</file>
+
+<file path=ppt/slides/slide6.xml><?xml version="1.0" encoding="utf-8"?>
+<p:sld xmlns:a="http://schemas.openxmlformats.org/drawingml/2006/main" xmlns:r="http://schemas.openxmlformats.org/officeDocument/2006/relationships" xmlns:p="http://schemas.openxmlformats.org/presentationml/2006/main">
+  <p:cSld>
+    <p:spTree>
+      <p:nvGrpSpPr>
+        <p:cNvPr id="1" name=""/>
+        <p:cNvGrpSpPr/>
+        <p:nvPr/>
+      </p:nvGrpSpPr>
+      <p:grpSpPr>
+        <a:xfrm>
+          <a:off x="0" y="0"/>
+          <a:ext cx="0" cy="0"/>
+          <a:chOff x="0" y="0"/>
+          <a:chExt cx="0" cy="0"/>
+        </a:xfrm>
+      </p:grpSpPr>
+      <p:pic>
+        <p:nvPicPr>
+          <p:cNvPr id="23" name="Picture 22" descr="Chart, line chart, scatter chart&#10;&#10;Description automatically generated">
+            <a:extLst>
+              <a:ext uri="{FF2B5EF4-FFF2-40B4-BE49-F238E27FC236}">
+                <a16:creationId xmlns:a16="http://schemas.microsoft.com/office/drawing/2014/main" id="{3A099E96-7C5D-FD9A-09D4-55F42FD207D0}"/>
+              </a:ext>
+            </a:extLst>
+          </p:cNvPr>
+          <p:cNvPicPr>
+            <a:picLocks noChangeAspect="1"/>
+          </p:cNvPicPr>
+          <p:nvPr/>
+        </p:nvPicPr>
+        <p:blipFill rotWithShape="1">
+          <a:blip r:embed="rId2">
+            <a:extLst>
+              <a:ext uri="{28A0092B-C50C-407E-A947-70E740481C1C}">
+                <a14:useLocalDpi xmlns:a14="http://schemas.microsoft.com/office/drawing/2010/main" val="0"/>
+              </a:ext>
+            </a:extLst>
+          </a:blip>
+          <a:srcRect l="12265" r="6392"/>
+          <a:stretch/>
+        </p:blipFill>
+        <p:spPr>
+          <a:xfrm>
+            <a:off x="8233035" y="2305171"/>
+            <a:ext cx="3958965" cy="2433514"/>
+          </a:xfrm>
+          <a:prstGeom prst="rect">
+            <a:avLst/>
+          </a:prstGeom>
+        </p:spPr>
+      </p:pic>
+      <p:pic>
+        <p:nvPicPr>
+          <p:cNvPr id="19" name="Picture 18" descr="Chart, line chart, scatter chart&#10;&#10;Description automatically generated">
+            <a:extLst>
+              <a:ext uri="{FF2B5EF4-FFF2-40B4-BE49-F238E27FC236}">
+                <a16:creationId xmlns:a16="http://schemas.microsoft.com/office/drawing/2014/main" id="{04857404-10F9-7F66-F626-D550A6A0D253}"/>
+              </a:ext>
+            </a:extLst>
+          </p:cNvPr>
+          <p:cNvPicPr>
+            <a:picLocks noChangeAspect="1"/>
+          </p:cNvPicPr>
+          <p:nvPr/>
+        </p:nvPicPr>
+        <p:blipFill>
+          <a:blip r:embed="rId3">
+            <a:extLst>
+              <a:ext uri="{28A0092B-C50C-407E-A947-70E740481C1C}">
+                <a14:useLocalDpi xmlns:a14="http://schemas.microsoft.com/office/drawing/2010/main" val="0"/>
+              </a:ext>
+            </a:extLst>
+          </a:blip>
+          <a:stretch>
+            <a:fillRect/>
+          </a:stretch>
+        </p:blipFill>
+        <p:spPr>
+          <a:xfrm>
+            <a:off x="1" y="2311383"/>
+            <a:ext cx="4867028" cy="2433514"/>
+          </a:xfrm>
+          <a:prstGeom prst="rect">
+            <a:avLst/>
+          </a:prstGeom>
+        </p:spPr>
+      </p:pic>
+      <p:pic>
+        <p:nvPicPr>
+          <p:cNvPr id="21" name="Picture 20" descr="Chart, line chart, scatter chart&#10;&#10;Description automatically generated">
+            <a:extLst>
+              <a:ext uri="{FF2B5EF4-FFF2-40B4-BE49-F238E27FC236}">
+                <a16:creationId xmlns:a16="http://schemas.microsoft.com/office/drawing/2014/main" id="{DB953728-B2AD-1DE7-8D60-DD32400B631C}"/>
+              </a:ext>
+            </a:extLst>
+          </p:cNvPr>
+          <p:cNvPicPr>
+            <a:picLocks noChangeAspect="1"/>
+          </p:cNvPicPr>
+          <p:nvPr/>
+        </p:nvPicPr>
+        <p:blipFill rotWithShape="1">
+          <a:blip r:embed="rId4">
+            <a:extLst>
+              <a:ext uri="{28A0092B-C50C-407E-A947-70E740481C1C}">
+                <a14:useLocalDpi xmlns:a14="http://schemas.microsoft.com/office/drawing/2010/main" val="0"/>
+              </a:ext>
+            </a:extLst>
+          </a:blip>
+          <a:srcRect l="12266" r="9221"/>
+          <a:stretch/>
+        </p:blipFill>
+        <p:spPr>
+          <a:xfrm>
+            <a:off x="4411745" y="2311383"/>
+            <a:ext cx="3821289" cy="2433514"/>
+          </a:xfrm>
+          <a:prstGeom prst="rect">
+            <a:avLst/>
+          </a:prstGeom>
+        </p:spPr>
+      </p:pic>
+      <p:pic>
+        <p:nvPicPr>
+          <p:cNvPr id="9" name="Picture 8" descr="Chart, line chart&#10;&#10;Description automatically generated">
+            <a:extLst>
+              <a:ext uri="{FF2B5EF4-FFF2-40B4-BE49-F238E27FC236}">
+                <a16:creationId xmlns:a16="http://schemas.microsoft.com/office/drawing/2014/main" id="{EEED7245-0442-71E3-1FD6-14C3E038A788}"/>
+              </a:ext>
+            </a:extLst>
+          </p:cNvPr>
+          <p:cNvPicPr>
+            <a:picLocks noChangeAspect="1"/>
+          </p:cNvPicPr>
+          <p:nvPr/>
+        </p:nvPicPr>
+        <p:blipFill>
+          <a:blip r:embed="rId5">
+            <a:extLst>
+              <a:ext uri="{28A0092B-C50C-407E-A947-70E740481C1C}">
+                <a14:useLocalDpi xmlns:a14="http://schemas.microsoft.com/office/drawing/2010/main" val="0"/>
+              </a:ext>
+            </a:extLst>
+          </a:blip>
+          <a:stretch>
+            <a:fillRect/>
+          </a:stretch>
+        </p:blipFill>
+        <p:spPr>
+          <a:xfrm>
+            <a:off x="1" y="0"/>
+            <a:ext cx="4867028" cy="2433514"/>
+          </a:xfrm>
+          <a:prstGeom prst="rect">
+            <a:avLst/>
+          </a:prstGeom>
+        </p:spPr>
+      </p:pic>
+      <p:pic>
+        <p:nvPicPr>
+          <p:cNvPr id="14" name="Picture 13" descr="Chart, line chart, scatter chart&#10;&#10;Description automatically generated">
+            <a:extLst>
+              <a:ext uri="{FF2B5EF4-FFF2-40B4-BE49-F238E27FC236}">
+                <a16:creationId xmlns:a16="http://schemas.microsoft.com/office/drawing/2014/main" id="{331AE91B-0D87-0DDD-F7A9-6B1C062938A8}"/>
+              </a:ext>
+            </a:extLst>
+          </p:cNvPr>
+          <p:cNvPicPr>
+            <a:picLocks noChangeAspect="1"/>
+          </p:cNvPicPr>
+          <p:nvPr/>
+        </p:nvPicPr>
+        <p:blipFill rotWithShape="1">
+          <a:blip r:embed="rId6">
+            <a:extLst>
+              <a:ext uri="{28A0092B-C50C-407E-A947-70E740481C1C}">
+                <a14:useLocalDpi xmlns:a14="http://schemas.microsoft.com/office/drawing/2010/main" val="0"/>
+              </a:ext>
+            </a:extLst>
+          </a:blip>
+          <a:srcRect l="12266"/>
+          <a:stretch/>
+        </p:blipFill>
+        <p:spPr>
+          <a:xfrm>
+            <a:off x="4411745" y="0"/>
+            <a:ext cx="4270050" cy="2433514"/>
+          </a:xfrm>
+          <a:prstGeom prst="rect">
+            <a:avLst/>
+          </a:prstGeom>
+        </p:spPr>
+      </p:pic>
+      <p:pic>
+        <p:nvPicPr>
+          <p:cNvPr id="17" name="Picture 16" descr="Chart, line chart&#10;&#10;Description automatically generated">
+            <a:extLst>
+              <a:ext uri="{FF2B5EF4-FFF2-40B4-BE49-F238E27FC236}">
+                <a16:creationId xmlns:a16="http://schemas.microsoft.com/office/drawing/2014/main" id="{195120E9-7205-F029-5893-8E1CD0A71F78}"/>
+              </a:ext>
+            </a:extLst>
+          </p:cNvPr>
+          <p:cNvPicPr>
+            <a:picLocks noChangeAspect="1"/>
+          </p:cNvPicPr>
+          <p:nvPr/>
+        </p:nvPicPr>
+        <p:blipFill rotWithShape="1">
+          <a:blip r:embed="rId7">
+            <a:extLst>
+              <a:ext uri="{28A0092B-C50C-407E-A947-70E740481C1C}">
+                <a14:useLocalDpi xmlns:a14="http://schemas.microsoft.com/office/drawing/2010/main" val="0"/>
+              </a:ext>
+            </a:extLst>
+          </a:blip>
+          <a:srcRect l="12265" r="6392"/>
+          <a:stretch/>
+        </p:blipFill>
+        <p:spPr>
+          <a:xfrm>
+            <a:off x="8233035" y="0"/>
+            <a:ext cx="3958964" cy="2433514"/>
+          </a:xfrm>
+          <a:prstGeom prst="rect">
+            <a:avLst/>
+          </a:prstGeom>
+        </p:spPr>
+      </p:pic>
+    </p:spTree>
+    <p:extLst>
+      <p:ext uri="{BB962C8B-B14F-4D97-AF65-F5344CB8AC3E}">
+        <p14:creationId xmlns:p14="http://schemas.microsoft.com/office/powerpoint/2010/main" val="1974845773"/>
       </p:ext>
     </p:extLst>
   </p:cSld>

</xml_diff>